<commit_message>
Sidebar and styled text. Minor bug exists, see Trello
</commit_message>
<xml_diff>
--- a/Card_Workspace.pptx
+++ b/Card_Workspace.pptx
@@ -242,7 +242,7 @@
           <a:p>
             <a:fld id="{6CF9682D-768F-4AA3-9D0E-91D451BE2888}" type="datetimeFigureOut">
               <a:rPr lang="en-US" smtClean="0"/>
-              <a:t>7/11/2019</a:t>
+              <a:t>7/12/2019</a:t>
             </a:fld>
             <a:endParaRPr lang="en-US"/>
           </a:p>
@@ -410,7 +410,7 @@
           <a:p>
             <a:fld id="{6CF9682D-768F-4AA3-9D0E-91D451BE2888}" type="datetimeFigureOut">
               <a:rPr lang="en-US" smtClean="0"/>
-              <a:t>7/11/2019</a:t>
+              <a:t>7/12/2019</a:t>
             </a:fld>
             <a:endParaRPr lang="en-US"/>
           </a:p>
@@ -588,7 +588,7 @@
           <a:p>
             <a:fld id="{6CF9682D-768F-4AA3-9D0E-91D451BE2888}" type="datetimeFigureOut">
               <a:rPr lang="en-US" smtClean="0"/>
-              <a:t>7/11/2019</a:t>
+              <a:t>7/12/2019</a:t>
             </a:fld>
             <a:endParaRPr lang="en-US"/>
           </a:p>
@@ -756,7 +756,7 @@
           <a:p>
             <a:fld id="{6CF9682D-768F-4AA3-9D0E-91D451BE2888}" type="datetimeFigureOut">
               <a:rPr lang="en-US" smtClean="0"/>
-              <a:t>7/11/2019</a:t>
+              <a:t>7/12/2019</a:t>
             </a:fld>
             <a:endParaRPr lang="en-US"/>
           </a:p>
@@ -1001,7 +1001,7 @@
           <a:p>
             <a:fld id="{6CF9682D-768F-4AA3-9D0E-91D451BE2888}" type="datetimeFigureOut">
               <a:rPr lang="en-US" smtClean="0"/>
-              <a:t>7/11/2019</a:t>
+              <a:t>7/12/2019</a:t>
             </a:fld>
             <a:endParaRPr lang="en-US"/>
           </a:p>
@@ -1230,7 +1230,7 @@
           <a:p>
             <a:fld id="{6CF9682D-768F-4AA3-9D0E-91D451BE2888}" type="datetimeFigureOut">
               <a:rPr lang="en-US" smtClean="0"/>
-              <a:t>7/11/2019</a:t>
+              <a:t>7/12/2019</a:t>
             </a:fld>
             <a:endParaRPr lang="en-US"/>
           </a:p>
@@ -1594,7 +1594,7 @@
           <a:p>
             <a:fld id="{6CF9682D-768F-4AA3-9D0E-91D451BE2888}" type="datetimeFigureOut">
               <a:rPr lang="en-US" smtClean="0"/>
-              <a:t>7/11/2019</a:t>
+              <a:t>7/12/2019</a:t>
             </a:fld>
             <a:endParaRPr lang="en-US"/>
           </a:p>
@@ -1711,7 +1711,7 @@
           <a:p>
             <a:fld id="{6CF9682D-768F-4AA3-9D0E-91D451BE2888}" type="datetimeFigureOut">
               <a:rPr lang="en-US" smtClean="0"/>
-              <a:t>7/11/2019</a:t>
+              <a:t>7/12/2019</a:t>
             </a:fld>
             <a:endParaRPr lang="en-US"/>
           </a:p>
@@ -1806,7 +1806,7 @@
           <a:p>
             <a:fld id="{6CF9682D-768F-4AA3-9D0E-91D451BE2888}" type="datetimeFigureOut">
               <a:rPr lang="en-US" smtClean="0"/>
-              <a:t>7/11/2019</a:t>
+              <a:t>7/12/2019</a:t>
             </a:fld>
             <a:endParaRPr lang="en-US"/>
           </a:p>
@@ -2081,7 +2081,7 @@
           <a:p>
             <a:fld id="{6CF9682D-768F-4AA3-9D0E-91D451BE2888}" type="datetimeFigureOut">
               <a:rPr lang="en-US" smtClean="0"/>
-              <a:t>7/11/2019</a:t>
+              <a:t>7/12/2019</a:t>
             </a:fld>
             <a:endParaRPr lang="en-US"/>
           </a:p>
@@ -2333,7 +2333,7 @@
           <a:p>
             <a:fld id="{6CF9682D-768F-4AA3-9D0E-91D451BE2888}" type="datetimeFigureOut">
               <a:rPr lang="en-US" smtClean="0"/>
-              <a:t>7/11/2019</a:t>
+              <a:t>7/12/2019</a:t>
             </a:fld>
             <a:endParaRPr lang="en-US"/>
           </a:p>
@@ -2544,7 +2544,7 @@
           <a:p>
             <a:fld id="{6CF9682D-768F-4AA3-9D0E-91D451BE2888}" type="datetimeFigureOut">
               <a:rPr lang="en-US" smtClean="0"/>
-              <a:t>7/11/2019</a:t>
+              <a:t>7/12/2019</a:t>
             </a:fld>
             <a:endParaRPr lang="en-US"/>
           </a:p>
@@ -2949,6 +2949,58 @@
           <a:chExt cx="0" cy="0"/>
         </a:xfrm>
       </p:grpSpPr>
+      <p:sp>
+        <p:nvSpPr>
+          <p:cNvPr id="3" name="矩形 2">
+            <a:extLst>
+              <a:ext uri="{FF2B5EF4-FFF2-40B4-BE49-F238E27FC236}">
+                <a16:creationId xmlns:a16="http://schemas.microsoft.com/office/drawing/2014/main" id="{9A42D856-8448-4C49-A14F-795E29CB2EFA}"/>
+              </a:ext>
+            </a:extLst>
+          </p:cNvPr>
+          <p:cNvSpPr/>
+          <p:nvPr/>
+        </p:nvSpPr>
+        <p:spPr>
+          <a:xfrm>
+            <a:off x="3890247" y="173605"/>
+            <a:ext cx="3240000" cy="5400000"/>
+          </a:xfrm>
+          <a:prstGeom prst="rect">
+            <a:avLst/>
+          </a:prstGeom>
+          <a:solidFill>
+            <a:schemeClr val="bg1"/>
+          </a:solidFill>
+          <a:ln>
+            <a:noFill/>
+          </a:ln>
+        </p:spPr>
+        <p:style>
+          <a:lnRef idx="2">
+            <a:schemeClr val="accent1">
+              <a:shade val="50000"/>
+            </a:schemeClr>
+          </a:lnRef>
+          <a:fillRef idx="1">
+            <a:schemeClr val="accent1"/>
+          </a:fillRef>
+          <a:effectRef idx="0">
+            <a:schemeClr val="accent1"/>
+          </a:effectRef>
+          <a:fontRef idx="minor">
+            <a:schemeClr val="lt1"/>
+          </a:fontRef>
+        </p:style>
+        <p:txBody>
+          <a:bodyPr rtlCol="0" anchor="ctr"/>
+          <a:lstStyle/>
+          <a:p>
+            <a:pPr algn="ctr"/>
+            <a:endParaRPr lang="zh-CN" altLang="en-US" dirty="0"/>
+          </a:p>
+        </p:txBody>
+      </p:sp>
       <p:pic>
         <p:nvPicPr>
           <p:cNvPr id="22" name="Picture 21" hidden="1"/>
@@ -2984,1170 +3036,6 @@
           </a:ln>
         </p:spPr>
       </p:pic>
-      <p:sp>
-        <p:nvSpPr>
-          <p:cNvPr id="8" name="Rectangle 7"/>
-          <p:cNvSpPr/>
-          <p:nvPr/>
-        </p:nvSpPr>
-        <p:spPr>
-          <a:xfrm>
-            <a:off x="3887022" y="723900"/>
-            <a:ext cx="4209415" cy="26988"/>
-          </a:xfrm>
-          <a:custGeom>
-            <a:avLst/>
-            <a:gdLst>
-              <a:gd name="connsiteX0" fmla="*/ 0 w 4206240"/>
-              <a:gd name="connsiteY0" fmla="*/ 0 h 27432"/>
-              <a:gd name="connsiteX1" fmla="*/ 4206240 w 4206240"/>
-              <a:gd name="connsiteY1" fmla="*/ 0 h 27432"/>
-              <a:gd name="connsiteX2" fmla="*/ 4206240 w 4206240"/>
-              <a:gd name="connsiteY2" fmla="*/ 27432 h 27432"/>
-              <a:gd name="connsiteX3" fmla="*/ 0 w 4206240"/>
-              <a:gd name="connsiteY3" fmla="*/ 27432 h 27432"/>
-              <a:gd name="connsiteX4" fmla="*/ 0 w 4206240"/>
-              <a:gd name="connsiteY4" fmla="*/ 0 h 27432"/>
-              <a:gd name="connsiteX0" fmla="*/ 0 w 4206240"/>
-              <a:gd name="connsiteY0" fmla="*/ 340 h 27772"/>
-              <a:gd name="connsiteX1" fmla="*/ 2081978 w 4206240"/>
-              <a:gd name="connsiteY1" fmla="*/ 0 h 27772"/>
-              <a:gd name="connsiteX2" fmla="*/ 4206240 w 4206240"/>
-              <a:gd name="connsiteY2" fmla="*/ 340 h 27772"/>
-              <a:gd name="connsiteX3" fmla="*/ 4206240 w 4206240"/>
-              <a:gd name="connsiteY3" fmla="*/ 27772 h 27772"/>
-              <a:gd name="connsiteX4" fmla="*/ 0 w 4206240"/>
-              <a:gd name="connsiteY4" fmla="*/ 27772 h 27772"/>
-              <a:gd name="connsiteX5" fmla="*/ 0 w 4206240"/>
-              <a:gd name="connsiteY5" fmla="*/ 340 h 27772"/>
-              <a:gd name="connsiteX0" fmla="*/ 0 w 4206240"/>
-              <a:gd name="connsiteY0" fmla="*/ 340 h 27772"/>
-              <a:gd name="connsiteX1" fmla="*/ 2081978 w 4206240"/>
-              <a:gd name="connsiteY1" fmla="*/ 0 h 27772"/>
-              <a:gd name="connsiteX2" fmla="*/ 4206240 w 4206240"/>
-              <a:gd name="connsiteY2" fmla="*/ 340 h 27772"/>
-              <a:gd name="connsiteX3" fmla="*/ 4206240 w 4206240"/>
-              <a:gd name="connsiteY3" fmla="*/ 27772 h 27772"/>
-              <a:gd name="connsiteX4" fmla="*/ 2080390 w 4206240"/>
-              <a:gd name="connsiteY4" fmla="*/ 26988 h 27772"/>
-              <a:gd name="connsiteX5" fmla="*/ 0 w 4206240"/>
-              <a:gd name="connsiteY5" fmla="*/ 27772 h 27772"/>
-              <a:gd name="connsiteX6" fmla="*/ 0 w 4206240"/>
-              <a:gd name="connsiteY6" fmla="*/ 340 h 27772"/>
-              <a:gd name="connsiteX0" fmla="*/ 0 w 4207827"/>
-              <a:gd name="connsiteY0" fmla="*/ 13040 h 27772"/>
-              <a:gd name="connsiteX1" fmla="*/ 2083565 w 4207827"/>
-              <a:gd name="connsiteY1" fmla="*/ 0 h 27772"/>
-              <a:gd name="connsiteX2" fmla="*/ 4207827 w 4207827"/>
-              <a:gd name="connsiteY2" fmla="*/ 340 h 27772"/>
-              <a:gd name="connsiteX3" fmla="*/ 4207827 w 4207827"/>
-              <a:gd name="connsiteY3" fmla="*/ 27772 h 27772"/>
-              <a:gd name="connsiteX4" fmla="*/ 2081977 w 4207827"/>
-              <a:gd name="connsiteY4" fmla="*/ 26988 h 27772"/>
-              <a:gd name="connsiteX5" fmla="*/ 1587 w 4207827"/>
-              <a:gd name="connsiteY5" fmla="*/ 27772 h 27772"/>
-              <a:gd name="connsiteX6" fmla="*/ 0 w 4207827"/>
-              <a:gd name="connsiteY6" fmla="*/ 13040 h 27772"/>
-              <a:gd name="connsiteX0" fmla="*/ 0 w 4207827"/>
-              <a:gd name="connsiteY0" fmla="*/ 13040 h 27772"/>
-              <a:gd name="connsiteX1" fmla="*/ 2083565 w 4207827"/>
-              <a:gd name="connsiteY1" fmla="*/ 0 h 27772"/>
-              <a:gd name="connsiteX2" fmla="*/ 4207827 w 4207827"/>
-              <a:gd name="connsiteY2" fmla="*/ 340 h 27772"/>
-              <a:gd name="connsiteX3" fmla="*/ 4207827 w 4207827"/>
-              <a:gd name="connsiteY3" fmla="*/ 27772 h 27772"/>
-              <a:gd name="connsiteX4" fmla="*/ 2081977 w 4207827"/>
-              <a:gd name="connsiteY4" fmla="*/ 26988 h 27772"/>
-              <a:gd name="connsiteX5" fmla="*/ 1587 w 4207827"/>
-              <a:gd name="connsiteY5" fmla="*/ 18247 h 27772"/>
-              <a:gd name="connsiteX6" fmla="*/ 0 w 4207827"/>
-              <a:gd name="connsiteY6" fmla="*/ 13040 h 27772"/>
-              <a:gd name="connsiteX0" fmla="*/ 0 w 4207827"/>
-              <a:gd name="connsiteY0" fmla="*/ 13040 h 27772"/>
-              <a:gd name="connsiteX1" fmla="*/ 2083565 w 4207827"/>
-              <a:gd name="connsiteY1" fmla="*/ 0 h 27772"/>
-              <a:gd name="connsiteX2" fmla="*/ 4207827 w 4207827"/>
-              <a:gd name="connsiteY2" fmla="*/ 9865 h 27772"/>
-              <a:gd name="connsiteX3" fmla="*/ 4207827 w 4207827"/>
-              <a:gd name="connsiteY3" fmla="*/ 27772 h 27772"/>
-              <a:gd name="connsiteX4" fmla="*/ 2081977 w 4207827"/>
-              <a:gd name="connsiteY4" fmla="*/ 26988 h 27772"/>
-              <a:gd name="connsiteX5" fmla="*/ 1587 w 4207827"/>
-              <a:gd name="connsiteY5" fmla="*/ 18247 h 27772"/>
-              <a:gd name="connsiteX6" fmla="*/ 0 w 4207827"/>
-              <a:gd name="connsiteY6" fmla="*/ 13040 h 27772"/>
-              <a:gd name="connsiteX0" fmla="*/ 0 w 4209415"/>
-              <a:gd name="connsiteY0" fmla="*/ 13040 h 26988"/>
-              <a:gd name="connsiteX1" fmla="*/ 2083565 w 4209415"/>
-              <a:gd name="connsiteY1" fmla="*/ 0 h 26988"/>
-              <a:gd name="connsiteX2" fmla="*/ 4207827 w 4209415"/>
-              <a:gd name="connsiteY2" fmla="*/ 9865 h 26988"/>
-              <a:gd name="connsiteX3" fmla="*/ 4209415 w 4209415"/>
-              <a:gd name="connsiteY3" fmla="*/ 18247 h 26988"/>
-              <a:gd name="connsiteX4" fmla="*/ 2081977 w 4209415"/>
-              <a:gd name="connsiteY4" fmla="*/ 26988 h 26988"/>
-              <a:gd name="connsiteX5" fmla="*/ 1587 w 4209415"/>
-              <a:gd name="connsiteY5" fmla="*/ 18247 h 26988"/>
-              <a:gd name="connsiteX6" fmla="*/ 0 w 4209415"/>
-              <a:gd name="connsiteY6" fmla="*/ 13040 h 26988"/>
-              <a:gd name="connsiteX0" fmla="*/ 0 w 4209415"/>
-              <a:gd name="connsiteY0" fmla="*/ 13040 h 26988"/>
-              <a:gd name="connsiteX1" fmla="*/ 2083565 w 4209415"/>
-              <a:gd name="connsiteY1" fmla="*/ 0 h 26988"/>
-              <a:gd name="connsiteX2" fmla="*/ 4207827 w 4209415"/>
-              <a:gd name="connsiteY2" fmla="*/ 9865 h 26988"/>
-              <a:gd name="connsiteX3" fmla="*/ 4209415 w 4209415"/>
-              <a:gd name="connsiteY3" fmla="*/ 18247 h 26988"/>
-              <a:gd name="connsiteX4" fmla="*/ 3477391 w 4209415"/>
-              <a:gd name="connsiteY4" fmla="*/ 25400 h 26988"/>
-              <a:gd name="connsiteX5" fmla="*/ 2081977 w 4209415"/>
-              <a:gd name="connsiteY5" fmla="*/ 26988 h 26988"/>
-              <a:gd name="connsiteX6" fmla="*/ 1587 w 4209415"/>
-              <a:gd name="connsiteY6" fmla="*/ 18247 h 26988"/>
-              <a:gd name="connsiteX7" fmla="*/ 0 w 4209415"/>
-              <a:gd name="connsiteY7" fmla="*/ 13040 h 26988"/>
-              <a:gd name="connsiteX0" fmla="*/ 0 w 4209415"/>
-              <a:gd name="connsiteY0" fmla="*/ 13040 h 26988"/>
-              <a:gd name="connsiteX1" fmla="*/ 2083565 w 4209415"/>
-              <a:gd name="connsiteY1" fmla="*/ 0 h 26988"/>
-              <a:gd name="connsiteX2" fmla="*/ 4207827 w 4209415"/>
-              <a:gd name="connsiteY2" fmla="*/ 9865 h 26988"/>
-              <a:gd name="connsiteX3" fmla="*/ 4209415 w 4209415"/>
-              <a:gd name="connsiteY3" fmla="*/ 18247 h 26988"/>
-              <a:gd name="connsiteX4" fmla="*/ 3477391 w 4209415"/>
-              <a:gd name="connsiteY4" fmla="*/ 25400 h 26988"/>
-              <a:gd name="connsiteX5" fmla="*/ 2081977 w 4209415"/>
-              <a:gd name="connsiteY5" fmla="*/ 26988 h 26988"/>
-              <a:gd name="connsiteX6" fmla="*/ 616716 w 4209415"/>
-              <a:gd name="connsiteY6" fmla="*/ 23813 h 26988"/>
-              <a:gd name="connsiteX7" fmla="*/ 1587 w 4209415"/>
-              <a:gd name="connsiteY7" fmla="*/ 18247 h 26988"/>
-              <a:gd name="connsiteX8" fmla="*/ 0 w 4209415"/>
-              <a:gd name="connsiteY8" fmla="*/ 13040 h 26988"/>
-            </a:gdLst>
-            <a:ahLst/>
-            <a:cxnLst>
-              <a:cxn ang="0">
-                <a:pos x="connsiteX0" y="connsiteY0"/>
-              </a:cxn>
-              <a:cxn ang="0">
-                <a:pos x="connsiteX1" y="connsiteY1"/>
-              </a:cxn>
-              <a:cxn ang="0">
-                <a:pos x="connsiteX2" y="connsiteY2"/>
-              </a:cxn>
-              <a:cxn ang="0">
-                <a:pos x="connsiteX3" y="connsiteY3"/>
-              </a:cxn>
-              <a:cxn ang="0">
-                <a:pos x="connsiteX4" y="connsiteY4"/>
-              </a:cxn>
-              <a:cxn ang="0">
-                <a:pos x="connsiteX5" y="connsiteY5"/>
-              </a:cxn>
-              <a:cxn ang="0">
-                <a:pos x="connsiteX6" y="connsiteY6"/>
-              </a:cxn>
-              <a:cxn ang="0">
-                <a:pos x="connsiteX7" y="connsiteY7"/>
-              </a:cxn>
-              <a:cxn ang="0">
-                <a:pos x="connsiteX8" y="connsiteY8"/>
-              </a:cxn>
-            </a:cxnLst>
-            <a:rect l="l" t="t" r="r" b="b"/>
-            <a:pathLst>
-              <a:path w="4209415" h="26988">
-                <a:moveTo>
-                  <a:pt x="0" y="13040"/>
-                </a:moveTo>
-                <a:lnTo>
-                  <a:pt x="2083565" y="0"/>
-                </a:lnTo>
-                <a:lnTo>
-                  <a:pt x="4207827" y="9865"/>
-                </a:lnTo>
-                <a:lnTo>
-                  <a:pt x="4209415" y="18247"/>
-                </a:lnTo>
-                <a:lnTo>
-                  <a:pt x="3477391" y="25400"/>
-                </a:lnTo>
-                <a:lnTo>
-                  <a:pt x="2081977" y="26988"/>
-                </a:lnTo>
-                <a:lnTo>
-                  <a:pt x="616716" y="23813"/>
-                </a:lnTo>
-                <a:lnTo>
-                  <a:pt x="1587" y="18247"/>
-                </a:lnTo>
-                <a:lnTo>
-                  <a:pt x="0" y="13040"/>
-                </a:lnTo>
-                <a:close/>
-              </a:path>
-            </a:pathLst>
-          </a:custGeom>
-          <a:solidFill>
-            <a:schemeClr val="tx1"/>
-          </a:solidFill>
-          <a:ln>
-            <a:noFill/>
-          </a:ln>
-        </p:spPr>
-        <p:style>
-          <a:lnRef idx="2">
-            <a:schemeClr val="accent1">
-              <a:shade val="50000"/>
-            </a:schemeClr>
-          </a:lnRef>
-          <a:fillRef idx="1">
-            <a:schemeClr val="accent1"/>
-          </a:fillRef>
-          <a:effectRef idx="0">
-            <a:schemeClr val="accent1"/>
-          </a:effectRef>
-          <a:fontRef idx="minor">
-            <a:schemeClr val="lt1"/>
-          </a:fontRef>
-        </p:style>
-        <p:txBody>
-          <a:bodyPr rtlCol="0" anchor="ctr"/>
-          <a:lstStyle/>
-          <a:p>
-            <a:pPr algn="ctr"/>
-            <a:endParaRPr lang="en-US"/>
-          </a:p>
-        </p:txBody>
-      </p:sp>
-      <p:sp>
-        <p:nvSpPr>
-          <p:cNvPr id="9" name="Rectangle 7"/>
-          <p:cNvSpPr/>
-          <p:nvPr/>
-        </p:nvSpPr>
-        <p:spPr>
-          <a:xfrm>
-            <a:off x="3891470" y="1142440"/>
-            <a:ext cx="4209415" cy="9144"/>
-          </a:xfrm>
-          <a:custGeom>
-            <a:avLst/>
-            <a:gdLst>
-              <a:gd name="connsiteX0" fmla="*/ 0 w 4206240"/>
-              <a:gd name="connsiteY0" fmla="*/ 0 h 27432"/>
-              <a:gd name="connsiteX1" fmla="*/ 4206240 w 4206240"/>
-              <a:gd name="connsiteY1" fmla="*/ 0 h 27432"/>
-              <a:gd name="connsiteX2" fmla="*/ 4206240 w 4206240"/>
-              <a:gd name="connsiteY2" fmla="*/ 27432 h 27432"/>
-              <a:gd name="connsiteX3" fmla="*/ 0 w 4206240"/>
-              <a:gd name="connsiteY3" fmla="*/ 27432 h 27432"/>
-              <a:gd name="connsiteX4" fmla="*/ 0 w 4206240"/>
-              <a:gd name="connsiteY4" fmla="*/ 0 h 27432"/>
-              <a:gd name="connsiteX0" fmla="*/ 0 w 4206240"/>
-              <a:gd name="connsiteY0" fmla="*/ 340 h 27772"/>
-              <a:gd name="connsiteX1" fmla="*/ 2081978 w 4206240"/>
-              <a:gd name="connsiteY1" fmla="*/ 0 h 27772"/>
-              <a:gd name="connsiteX2" fmla="*/ 4206240 w 4206240"/>
-              <a:gd name="connsiteY2" fmla="*/ 340 h 27772"/>
-              <a:gd name="connsiteX3" fmla="*/ 4206240 w 4206240"/>
-              <a:gd name="connsiteY3" fmla="*/ 27772 h 27772"/>
-              <a:gd name="connsiteX4" fmla="*/ 0 w 4206240"/>
-              <a:gd name="connsiteY4" fmla="*/ 27772 h 27772"/>
-              <a:gd name="connsiteX5" fmla="*/ 0 w 4206240"/>
-              <a:gd name="connsiteY5" fmla="*/ 340 h 27772"/>
-              <a:gd name="connsiteX0" fmla="*/ 0 w 4206240"/>
-              <a:gd name="connsiteY0" fmla="*/ 340 h 27772"/>
-              <a:gd name="connsiteX1" fmla="*/ 2081978 w 4206240"/>
-              <a:gd name="connsiteY1" fmla="*/ 0 h 27772"/>
-              <a:gd name="connsiteX2" fmla="*/ 4206240 w 4206240"/>
-              <a:gd name="connsiteY2" fmla="*/ 340 h 27772"/>
-              <a:gd name="connsiteX3" fmla="*/ 4206240 w 4206240"/>
-              <a:gd name="connsiteY3" fmla="*/ 27772 h 27772"/>
-              <a:gd name="connsiteX4" fmla="*/ 2080390 w 4206240"/>
-              <a:gd name="connsiteY4" fmla="*/ 26988 h 27772"/>
-              <a:gd name="connsiteX5" fmla="*/ 0 w 4206240"/>
-              <a:gd name="connsiteY5" fmla="*/ 27772 h 27772"/>
-              <a:gd name="connsiteX6" fmla="*/ 0 w 4206240"/>
-              <a:gd name="connsiteY6" fmla="*/ 340 h 27772"/>
-              <a:gd name="connsiteX0" fmla="*/ 0 w 4207827"/>
-              <a:gd name="connsiteY0" fmla="*/ 13040 h 27772"/>
-              <a:gd name="connsiteX1" fmla="*/ 2083565 w 4207827"/>
-              <a:gd name="connsiteY1" fmla="*/ 0 h 27772"/>
-              <a:gd name="connsiteX2" fmla="*/ 4207827 w 4207827"/>
-              <a:gd name="connsiteY2" fmla="*/ 340 h 27772"/>
-              <a:gd name="connsiteX3" fmla="*/ 4207827 w 4207827"/>
-              <a:gd name="connsiteY3" fmla="*/ 27772 h 27772"/>
-              <a:gd name="connsiteX4" fmla="*/ 2081977 w 4207827"/>
-              <a:gd name="connsiteY4" fmla="*/ 26988 h 27772"/>
-              <a:gd name="connsiteX5" fmla="*/ 1587 w 4207827"/>
-              <a:gd name="connsiteY5" fmla="*/ 27772 h 27772"/>
-              <a:gd name="connsiteX6" fmla="*/ 0 w 4207827"/>
-              <a:gd name="connsiteY6" fmla="*/ 13040 h 27772"/>
-              <a:gd name="connsiteX0" fmla="*/ 0 w 4207827"/>
-              <a:gd name="connsiteY0" fmla="*/ 13040 h 27772"/>
-              <a:gd name="connsiteX1" fmla="*/ 2083565 w 4207827"/>
-              <a:gd name="connsiteY1" fmla="*/ 0 h 27772"/>
-              <a:gd name="connsiteX2" fmla="*/ 4207827 w 4207827"/>
-              <a:gd name="connsiteY2" fmla="*/ 340 h 27772"/>
-              <a:gd name="connsiteX3" fmla="*/ 4207827 w 4207827"/>
-              <a:gd name="connsiteY3" fmla="*/ 27772 h 27772"/>
-              <a:gd name="connsiteX4" fmla="*/ 2081977 w 4207827"/>
-              <a:gd name="connsiteY4" fmla="*/ 26988 h 27772"/>
-              <a:gd name="connsiteX5" fmla="*/ 1587 w 4207827"/>
-              <a:gd name="connsiteY5" fmla="*/ 18247 h 27772"/>
-              <a:gd name="connsiteX6" fmla="*/ 0 w 4207827"/>
-              <a:gd name="connsiteY6" fmla="*/ 13040 h 27772"/>
-              <a:gd name="connsiteX0" fmla="*/ 0 w 4207827"/>
-              <a:gd name="connsiteY0" fmla="*/ 13040 h 27772"/>
-              <a:gd name="connsiteX1" fmla="*/ 2083565 w 4207827"/>
-              <a:gd name="connsiteY1" fmla="*/ 0 h 27772"/>
-              <a:gd name="connsiteX2" fmla="*/ 4207827 w 4207827"/>
-              <a:gd name="connsiteY2" fmla="*/ 9865 h 27772"/>
-              <a:gd name="connsiteX3" fmla="*/ 4207827 w 4207827"/>
-              <a:gd name="connsiteY3" fmla="*/ 27772 h 27772"/>
-              <a:gd name="connsiteX4" fmla="*/ 2081977 w 4207827"/>
-              <a:gd name="connsiteY4" fmla="*/ 26988 h 27772"/>
-              <a:gd name="connsiteX5" fmla="*/ 1587 w 4207827"/>
-              <a:gd name="connsiteY5" fmla="*/ 18247 h 27772"/>
-              <a:gd name="connsiteX6" fmla="*/ 0 w 4207827"/>
-              <a:gd name="connsiteY6" fmla="*/ 13040 h 27772"/>
-              <a:gd name="connsiteX0" fmla="*/ 0 w 4209415"/>
-              <a:gd name="connsiteY0" fmla="*/ 13040 h 26988"/>
-              <a:gd name="connsiteX1" fmla="*/ 2083565 w 4209415"/>
-              <a:gd name="connsiteY1" fmla="*/ 0 h 26988"/>
-              <a:gd name="connsiteX2" fmla="*/ 4207827 w 4209415"/>
-              <a:gd name="connsiteY2" fmla="*/ 9865 h 26988"/>
-              <a:gd name="connsiteX3" fmla="*/ 4209415 w 4209415"/>
-              <a:gd name="connsiteY3" fmla="*/ 18247 h 26988"/>
-              <a:gd name="connsiteX4" fmla="*/ 2081977 w 4209415"/>
-              <a:gd name="connsiteY4" fmla="*/ 26988 h 26988"/>
-              <a:gd name="connsiteX5" fmla="*/ 1587 w 4209415"/>
-              <a:gd name="connsiteY5" fmla="*/ 18247 h 26988"/>
-              <a:gd name="connsiteX6" fmla="*/ 0 w 4209415"/>
-              <a:gd name="connsiteY6" fmla="*/ 13040 h 26988"/>
-              <a:gd name="connsiteX0" fmla="*/ 0 w 4209415"/>
-              <a:gd name="connsiteY0" fmla="*/ 13040 h 26988"/>
-              <a:gd name="connsiteX1" fmla="*/ 2083565 w 4209415"/>
-              <a:gd name="connsiteY1" fmla="*/ 0 h 26988"/>
-              <a:gd name="connsiteX2" fmla="*/ 4207827 w 4209415"/>
-              <a:gd name="connsiteY2" fmla="*/ 9865 h 26988"/>
-              <a:gd name="connsiteX3" fmla="*/ 4209415 w 4209415"/>
-              <a:gd name="connsiteY3" fmla="*/ 18247 h 26988"/>
-              <a:gd name="connsiteX4" fmla="*/ 3477391 w 4209415"/>
-              <a:gd name="connsiteY4" fmla="*/ 25400 h 26988"/>
-              <a:gd name="connsiteX5" fmla="*/ 2081977 w 4209415"/>
-              <a:gd name="connsiteY5" fmla="*/ 26988 h 26988"/>
-              <a:gd name="connsiteX6" fmla="*/ 1587 w 4209415"/>
-              <a:gd name="connsiteY6" fmla="*/ 18247 h 26988"/>
-              <a:gd name="connsiteX7" fmla="*/ 0 w 4209415"/>
-              <a:gd name="connsiteY7" fmla="*/ 13040 h 26988"/>
-              <a:gd name="connsiteX0" fmla="*/ 0 w 4209415"/>
-              <a:gd name="connsiteY0" fmla="*/ 13040 h 26988"/>
-              <a:gd name="connsiteX1" fmla="*/ 2083565 w 4209415"/>
-              <a:gd name="connsiteY1" fmla="*/ 0 h 26988"/>
-              <a:gd name="connsiteX2" fmla="*/ 4207827 w 4209415"/>
-              <a:gd name="connsiteY2" fmla="*/ 9865 h 26988"/>
-              <a:gd name="connsiteX3" fmla="*/ 4209415 w 4209415"/>
-              <a:gd name="connsiteY3" fmla="*/ 18247 h 26988"/>
-              <a:gd name="connsiteX4" fmla="*/ 3477391 w 4209415"/>
-              <a:gd name="connsiteY4" fmla="*/ 25400 h 26988"/>
-              <a:gd name="connsiteX5" fmla="*/ 2081977 w 4209415"/>
-              <a:gd name="connsiteY5" fmla="*/ 26988 h 26988"/>
-              <a:gd name="connsiteX6" fmla="*/ 616716 w 4209415"/>
-              <a:gd name="connsiteY6" fmla="*/ 23813 h 26988"/>
-              <a:gd name="connsiteX7" fmla="*/ 1587 w 4209415"/>
-              <a:gd name="connsiteY7" fmla="*/ 18247 h 26988"/>
-              <a:gd name="connsiteX8" fmla="*/ 0 w 4209415"/>
-              <a:gd name="connsiteY8" fmla="*/ 13040 h 26988"/>
-            </a:gdLst>
-            <a:ahLst/>
-            <a:cxnLst>
-              <a:cxn ang="0">
-                <a:pos x="connsiteX0" y="connsiteY0"/>
-              </a:cxn>
-              <a:cxn ang="0">
-                <a:pos x="connsiteX1" y="connsiteY1"/>
-              </a:cxn>
-              <a:cxn ang="0">
-                <a:pos x="connsiteX2" y="connsiteY2"/>
-              </a:cxn>
-              <a:cxn ang="0">
-                <a:pos x="connsiteX3" y="connsiteY3"/>
-              </a:cxn>
-              <a:cxn ang="0">
-                <a:pos x="connsiteX4" y="connsiteY4"/>
-              </a:cxn>
-              <a:cxn ang="0">
-                <a:pos x="connsiteX5" y="connsiteY5"/>
-              </a:cxn>
-              <a:cxn ang="0">
-                <a:pos x="connsiteX6" y="connsiteY6"/>
-              </a:cxn>
-              <a:cxn ang="0">
-                <a:pos x="connsiteX7" y="connsiteY7"/>
-              </a:cxn>
-              <a:cxn ang="0">
-                <a:pos x="connsiteX8" y="connsiteY8"/>
-              </a:cxn>
-            </a:cxnLst>
-            <a:rect l="l" t="t" r="r" b="b"/>
-            <a:pathLst>
-              <a:path w="4209415" h="26988">
-                <a:moveTo>
-                  <a:pt x="0" y="13040"/>
-                </a:moveTo>
-                <a:lnTo>
-                  <a:pt x="2083565" y="0"/>
-                </a:lnTo>
-                <a:lnTo>
-                  <a:pt x="4207827" y="9865"/>
-                </a:lnTo>
-                <a:lnTo>
-                  <a:pt x="4209415" y="18247"/>
-                </a:lnTo>
-                <a:lnTo>
-                  <a:pt x="3477391" y="25400"/>
-                </a:lnTo>
-                <a:lnTo>
-                  <a:pt x="2081977" y="26988"/>
-                </a:lnTo>
-                <a:lnTo>
-                  <a:pt x="616716" y="23813"/>
-                </a:lnTo>
-                <a:lnTo>
-                  <a:pt x="1587" y="18247"/>
-                </a:lnTo>
-                <a:lnTo>
-                  <a:pt x="0" y="13040"/>
-                </a:lnTo>
-                <a:close/>
-              </a:path>
-            </a:pathLst>
-          </a:custGeom>
-          <a:solidFill>
-            <a:schemeClr val="tx1"/>
-          </a:solidFill>
-          <a:ln>
-            <a:noFill/>
-          </a:ln>
-        </p:spPr>
-        <p:style>
-          <a:lnRef idx="2">
-            <a:schemeClr val="accent1">
-              <a:shade val="50000"/>
-            </a:schemeClr>
-          </a:lnRef>
-          <a:fillRef idx="1">
-            <a:schemeClr val="accent1"/>
-          </a:fillRef>
-          <a:effectRef idx="0">
-            <a:schemeClr val="accent1"/>
-          </a:effectRef>
-          <a:fontRef idx="minor">
-            <a:schemeClr val="lt1"/>
-          </a:fontRef>
-        </p:style>
-        <p:txBody>
-          <a:bodyPr rtlCol="0" anchor="ctr"/>
-          <a:lstStyle/>
-          <a:p>
-            <a:pPr algn="ctr"/>
-            <a:endParaRPr lang="en-US"/>
-          </a:p>
-        </p:txBody>
-      </p:sp>
-      <p:sp>
-        <p:nvSpPr>
-          <p:cNvPr id="10" name="Rectangle 7"/>
-          <p:cNvSpPr/>
-          <p:nvPr/>
-        </p:nvSpPr>
-        <p:spPr>
-          <a:xfrm>
-            <a:off x="3891262" y="4635481"/>
-            <a:ext cx="4209415" cy="26988"/>
-          </a:xfrm>
-          <a:custGeom>
-            <a:avLst/>
-            <a:gdLst>
-              <a:gd name="connsiteX0" fmla="*/ 0 w 4206240"/>
-              <a:gd name="connsiteY0" fmla="*/ 0 h 27432"/>
-              <a:gd name="connsiteX1" fmla="*/ 4206240 w 4206240"/>
-              <a:gd name="connsiteY1" fmla="*/ 0 h 27432"/>
-              <a:gd name="connsiteX2" fmla="*/ 4206240 w 4206240"/>
-              <a:gd name="connsiteY2" fmla="*/ 27432 h 27432"/>
-              <a:gd name="connsiteX3" fmla="*/ 0 w 4206240"/>
-              <a:gd name="connsiteY3" fmla="*/ 27432 h 27432"/>
-              <a:gd name="connsiteX4" fmla="*/ 0 w 4206240"/>
-              <a:gd name="connsiteY4" fmla="*/ 0 h 27432"/>
-              <a:gd name="connsiteX0" fmla="*/ 0 w 4206240"/>
-              <a:gd name="connsiteY0" fmla="*/ 340 h 27772"/>
-              <a:gd name="connsiteX1" fmla="*/ 2081978 w 4206240"/>
-              <a:gd name="connsiteY1" fmla="*/ 0 h 27772"/>
-              <a:gd name="connsiteX2" fmla="*/ 4206240 w 4206240"/>
-              <a:gd name="connsiteY2" fmla="*/ 340 h 27772"/>
-              <a:gd name="connsiteX3" fmla="*/ 4206240 w 4206240"/>
-              <a:gd name="connsiteY3" fmla="*/ 27772 h 27772"/>
-              <a:gd name="connsiteX4" fmla="*/ 0 w 4206240"/>
-              <a:gd name="connsiteY4" fmla="*/ 27772 h 27772"/>
-              <a:gd name="connsiteX5" fmla="*/ 0 w 4206240"/>
-              <a:gd name="connsiteY5" fmla="*/ 340 h 27772"/>
-              <a:gd name="connsiteX0" fmla="*/ 0 w 4206240"/>
-              <a:gd name="connsiteY0" fmla="*/ 340 h 27772"/>
-              <a:gd name="connsiteX1" fmla="*/ 2081978 w 4206240"/>
-              <a:gd name="connsiteY1" fmla="*/ 0 h 27772"/>
-              <a:gd name="connsiteX2" fmla="*/ 4206240 w 4206240"/>
-              <a:gd name="connsiteY2" fmla="*/ 340 h 27772"/>
-              <a:gd name="connsiteX3" fmla="*/ 4206240 w 4206240"/>
-              <a:gd name="connsiteY3" fmla="*/ 27772 h 27772"/>
-              <a:gd name="connsiteX4" fmla="*/ 2080390 w 4206240"/>
-              <a:gd name="connsiteY4" fmla="*/ 26988 h 27772"/>
-              <a:gd name="connsiteX5" fmla="*/ 0 w 4206240"/>
-              <a:gd name="connsiteY5" fmla="*/ 27772 h 27772"/>
-              <a:gd name="connsiteX6" fmla="*/ 0 w 4206240"/>
-              <a:gd name="connsiteY6" fmla="*/ 340 h 27772"/>
-              <a:gd name="connsiteX0" fmla="*/ 0 w 4207827"/>
-              <a:gd name="connsiteY0" fmla="*/ 13040 h 27772"/>
-              <a:gd name="connsiteX1" fmla="*/ 2083565 w 4207827"/>
-              <a:gd name="connsiteY1" fmla="*/ 0 h 27772"/>
-              <a:gd name="connsiteX2" fmla="*/ 4207827 w 4207827"/>
-              <a:gd name="connsiteY2" fmla="*/ 340 h 27772"/>
-              <a:gd name="connsiteX3" fmla="*/ 4207827 w 4207827"/>
-              <a:gd name="connsiteY3" fmla="*/ 27772 h 27772"/>
-              <a:gd name="connsiteX4" fmla="*/ 2081977 w 4207827"/>
-              <a:gd name="connsiteY4" fmla="*/ 26988 h 27772"/>
-              <a:gd name="connsiteX5" fmla="*/ 1587 w 4207827"/>
-              <a:gd name="connsiteY5" fmla="*/ 27772 h 27772"/>
-              <a:gd name="connsiteX6" fmla="*/ 0 w 4207827"/>
-              <a:gd name="connsiteY6" fmla="*/ 13040 h 27772"/>
-              <a:gd name="connsiteX0" fmla="*/ 0 w 4207827"/>
-              <a:gd name="connsiteY0" fmla="*/ 13040 h 27772"/>
-              <a:gd name="connsiteX1" fmla="*/ 2083565 w 4207827"/>
-              <a:gd name="connsiteY1" fmla="*/ 0 h 27772"/>
-              <a:gd name="connsiteX2" fmla="*/ 4207827 w 4207827"/>
-              <a:gd name="connsiteY2" fmla="*/ 340 h 27772"/>
-              <a:gd name="connsiteX3" fmla="*/ 4207827 w 4207827"/>
-              <a:gd name="connsiteY3" fmla="*/ 27772 h 27772"/>
-              <a:gd name="connsiteX4" fmla="*/ 2081977 w 4207827"/>
-              <a:gd name="connsiteY4" fmla="*/ 26988 h 27772"/>
-              <a:gd name="connsiteX5" fmla="*/ 1587 w 4207827"/>
-              <a:gd name="connsiteY5" fmla="*/ 18247 h 27772"/>
-              <a:gd name="connsiteX6" fmla="*/ 0 w 4207827"/>
-              <a:gd name="connsiteY6" fmla="*/ 13040 h 27772"/>
-              <a:gd name="connsiteX0" fmla="*/ 0 w 4207827"/>
-              <a:gd name="connsiteY0" fmla="*/ 13040 h 27772"/>
-              <a:gd name="connsiteX1" fmla="*/ 2083565 w 4207827"/>
-              <a:gd name="connsiteY1" fmla="*/ 0 h 27772"/>
-              <a:gd name="connsiteX2" fmla="*/ 4207827 w 4207827"/>
-              <a:gd name="connsiteY2" fmla="*/ 9865 h 27772"/>
-              <a:gd name="connsiteX3" fmla="*/ 4207827 w 4207827"/>
-              <a:gd name="connsiteY3" fmla="*/ 27772 h 27772"/>
-              <a:gd name="connsiteX4" fmla="*/ 2081977 w 4207827"/>
-              <a:gd name="connsiteY4" fmla="*/ 26988 h 27772"/>
-              <a:gd name="connsiteX5" fmla="*/ 1587 w 4207827"/>
-              <a:gd name="connsiteY5" fmla="*/ 18247 h 27772"/>
-              <a:gd name="connsiteX6" fmla="*/ 0 w 4207827"/>
-              <a:gd name="connsiteY6" fmla="*/ 13040 h 27772"/>
-              <a:gd name="connsiteX0" fmla="*/ 0 w 4209415"/>
-              <a:gd name="connsiteY0" fmla="*/ 13040 h 26988"/>
-              <a:gd name="connsiteX1" fmla="*/ 2083565 w 4209415"/>
-              <a:gd name="connsiteY1" fmla="*/ 0 h 26988"/>
-              <a:gd name="connsiteX2" fmla="*/ 4207827 w 4209415"/>
-              <a:gd name="connsiteY2" fmla="*/ 9865 h 26988"/>
-              <a:gd name="connsiteX3" fmla="*/ 4209415 w 4209415"/>
-              <a:gd name="connsiteY3" fmla="*/ 18247 h 26988"/>
-              <a:gd name="connsiteX4" fmla="*/ 2081977 w 4209415"/>
-              <a:gd name="connsiteY4" fmla="*/ 26988 h 26988"/>
-              <a:gd name="connsiteX5" fmla="*/ 1587 w 4209415"/>
-              <a:gd name="connsiteY5" fmla="*/ 18247 h 26988"/>
-              <a:gd name="connsiteX6" fmla="*/ 0 w 4209415"/>
-              <a:gd name="connsiteY6" fmla="*/ 13040 h 26988"/>
-              <a:gd name="connsiteX0" fmla="*/ 0 w 4209415"/>
-              <a:gd name="connsiteY0" fmla="*/ 13040 h 26988"/>
-              <a:gd name="connsiteX1" fmla="*/ 2083565 w 4209415"/>
-              <a:gd name="connsiteY1" fmla="*/ 0 h 26988"/>
-              <a:gd name="connsiteX2" fmla="*/ 4207827 w 4209415"/>
-              <a:gd name="connsiteY2" fmla="*/ 9865 h 26988"/>
-              <a:gd name="connsiteX3" fmla="*/ 4209415 w 4209415"/>
-              <a:gd name="connsiteY3" fmla="*/ 18247 h 26988"/>
-              <a:gd name="connsiteX4" fmla="*/ 3477391 w 4209415"/>
-              <a:gd name="connsiteY4" fmla="*/ 25400 h 26988"/>
-              <a:gd name="connsiteX5" fmla="*/ 2081977 w 4209415"/>
-              <a:gd name="connsiteY5" fmla="*/ 26988 h 26988"/>
-              <a:gd name="connsiteX6" fmla="*/ 1587 w 4209415"/>
-              <a:gd name="connsiteY6" fmla="*/ 18247 h 26988"/>
-              <a:gd name="connsiteX7" fmla="*/ 0 w 4209415"/>
-              <a:gd name="connsiteY7" fmla="*/ 13040 h 26988"/>
-              <a:gd name="connsiteX0" fmla="*/ 0 w 4209415"/>
-              <a:gd name="connsiteY0" fmla="*/ 13040 h 26988"/>
-              <a:gd name="connsiteX1" fmla="*/ 2083565 w 4209415"/>
-              <a:gd name="connsiteY1" fmla="*/ 0 h 26988"/>
-              <a:gd name="connsiteX2" fmla="*/ 4207827 w 4209415"/>
-              <a:gd name="connsiteY2" fmla="*/ 9865 h 26988"/>
-              <a:gd name="connsiteX3" fmla="*/ 4209415 w 4209415"/>
-              <a:gd name="connsiteY3" fmla="*/ 18247 h 26988"/>
-              <a:gd name="connsiteX4" fmla="*/ 3477391 w 4209415"/>
-              <a:gd name="connsiteY4" fmla="*/ 25400 h 26988"/>
-              <a:gd name="connsiteX5" fmla="*/ 2081977 w 4209415"/>
-              <a:gd name="connsiteY5" fmla="*/ 26988 h 26988"/>
-              <a:gd name="connsiteX6" fmla="*/ 616716 w 4209415"/>
-              <a:gd name="connsiteY6" fmla="*/ 23813 h 26988"/>
-              <a:gd name="connsiteX7" fmla="*/ 1587 w 4209415"/>
-              <a:gd name="connsiteY7" fmla="*/ 18247 h 26988"/>
-              <a:gd name="connsiteX8" fmla="*/ 0 w 4209415"/>
-              <a:gd name="connsiteY8" fmla="*/ 13040 h 26988"/>
-            </a:gdLst>
-            <a:ahLst/>
-            <a:cxnLst>
-              <a:cxn ang="0">
-                <a:pos x="connsiteX0" y="connsiteY0"/>
-              </a:cxn>
-              <a:cxn ang="0">
-                <a:pos x="connsiteX1" y="connsiteY1"/>
-              </a:cxn>
-              <a:cxn ang="0">
-                <a:pos x="connsiteX2" y="connsiteY2"/>
-              </a:cxn>
-              <a:cxn ang="0">
-                <a:pos x="connsiteX3" y="connsiteY3"/>
-              </a:cxn>
-              <a:cxn ang="0">
-                <a:pos x="connsiteX4" y="connsiteY4"/>
-              </a:cxn>
-              <a:cxn ang="0">
-                <a:pos x="connsiteX5" y="connsiteY5"/>
-              </a:cxn>
-              <a:cxn ang="0">
-                <a:pos x="connsiteX6" y="connsiteY6"/>
-              </a:cxn>
-              <a:cxn ang="0">
-                <a:pos x="connsiteX7" y="connsiteY7"/>
-              </a:cxn>
-              <a:cxn ang="0">
-                <a:pos x="connsiteX8" y="connsiteY8"/>
-              </a:cxn>
-            </a:cxnLst>
-            <a:rect l="l" t="t" r="r" b="b"/>
-            <a:pathLst>
-              <a:path w="4209415" h="26988">
-                <a:moveTo>
-                  <a:pt x="0" y="13040"/>
-                </a:moveTo>
-                <a:lnTo>
-                  <a:pt x="2083565" y="0"/>
-                </a:lnTo>
-                <a:lnTo>
-                  <a:pt x="4207827" y="9865"/>
-                </a:lnTo>
-                <a:lnTo>
-                  <a:pt x="4209415" y="18247"/>
-                </a:lnTo>
-                <a:lnTo>
-                  <a:pt x="3477391" y="25400"/>
-                </a:lnTo>
-                <a:lnTo>
-                  <a:pt x="2081977" y="26988"/>
-                </a:lnTo>
-                <a:lnTo>
-                  <a:pt x="616716" y="23813"/>
-                </a:lnTo>
-                <a:lnTo>
-                  <a:pt x="1587" y="18247"/>
-                </a:lnTo>
-                <a:lnTo>
-                  <a:pt x="0" y="13040"/>
-                </a:lnTo>
-                <a:close/>
-              </a:path>
-            </a:pathLst>
-          </a:custGeom>
-          <a:solidFill>
-            <a:schemeClr val="tx1"/>
-          </a:solidFill>
-          <a:ln>
-            <a:noFill/>
-          </a:ln>
-        </p:spPr>
-        <p:style>
-          <a:lnRef idx="2">
-            <a:schemeClr val="accent1">
-              <a:shade val="50000"/>
-            </a:schemeClr>
-          </a:lnRef>
-          <a:fillRef idx="1">
-            <a:schemeClr val="accent1"/>
-          </a:fillRef>
-          <a:effectRef idx="0">
-            <a:schemeClr val="accent1"/>
-          </a:effectRef>
-          <a:fontRef idx="minor">
-            <a:schemeClr val="lt1"/>
-          </a:fontRef>
-        </p:style>
-        <p:txBody>
-          <a:bodyPr rtlCol="0" anchor="ctr"/>
-          <a:lstStyle/>
-          <a:p>
-            <a:pPr algn="ctr"/>
-            <a:endParaRPr lang="en-US"/>
-          </a:p>
-        </p:txBody>
-      </p:sp>
-      <p:sp>
-        <p:nvSpPr>
-          <p:cNvPr id="11" name="Rectangle 7"/>
-          <p:cNvSpPr/>
-          <p:nvPr/>
-        </p:nvSpPr>
-        <p:spPr>
-          <a:xfrm>
-            <a:off x="3891477" y="5379983"/>
-            <a:ext cx="4209415" cy="9144"/>
-          </a:xfrm>
-          <a:custGeom>
-            <a:avLst/>
-            <a:gdLst>
-              <a:gd name="connsiteX0" fmla="*/ 0 w 4206240"/>
-              <a:gd name="connsiteY0" fmla="*/ 0 h 27432"/>
-              <a:gd name="connsiteX1" fmla="*/ 4206240 w 4206240"/>
-              <a:gd name="connsiteY1" fmla="*/ 0 h 27432"/>
-              <a:gd name="connsiteX2" fmla="*/ 4206240 w 4206240"/>
-              <a:gd name="connsiteY2" fmla="*/ 27432 h 27432"/>
-              <a:gd name="connsiteX3" fmla="*/ 0 w 4206240"/>
-              <a:gd name="connsiteY3" fmla="*/ 27432 h 27432"/>
-              <a:gd name="connsiteX4" fmla="*/ 0 w 4206240"/>
-              <a:gd name="connsiteY4" fmla="*/ 0 h 27432"/>
-              <a:gd name="connsiteX0" fmla="*/ 0 w 4206240"/>
-              <a:gd name="connsiteY0" fmla="*/ 340 h 27772"/>
-              <a:gd name="connsiteX1" fmla="*/ 2081978 w 4206240"/>
-              <a:gd name="connsiteY1" fmla="*/ 0 h 27772"/>
-              <a:gd name="connsiteX2" fmla="*/ 4206240 w 4206240"/>
-              <a:gd name="connsiteY2" fmla="*/ 340 h 27772"/>
-              <a:gd name="connsiteX3" fmla="*/ 4206240 w 4206240"/>
-              <a:gd name="connsiteY3" fmla="*/ 27772 h 27772"/>
-              <a:gd name="connsiteX4" fmla="*/ 0 w 4206240"/>
-              <a:gd name="connsiteY4" fmla="*/ 27772 h 27772"/>
-              <a:gd name="connsiteX5" fmla="*/ 0 w 4206240"/>
-              <a:gd name="connsiteY5" fmla="*/ 340 h 27772"/>
-              <a:gd name="connsiteX0" fmla="*/ 0 w 4206240"/>
-              <a:gd name="connsiteY0" fmla="*/ 340 h 27772"/>
-              <a:gd name="connsiteX1" fmla="*/ 2081978 w 4206240"/>
-              <a:gd name="connsiteY1" fmla="*/ 0 h 27772"/>
-              <a:gd name="connsiteX2" fmla="*/ 4206240 w 4206240"/>
-              <a:gd name="connsiteY2" fmla="*/ 340 h 27772"/>
-              <a:gd name="connsiteX3" fmla="*/ 4206240 w 4206240"/>
-              <a:gd name="connsiteY3" fmla="*/ 27772 h 27772"/>
-              <a:gd name="connsiteX4" fmla="*/ 2080390 w 4206240"/>
-              <a:gd name="connsiteY4" fmla="*/ 26988 h 27772"/>
-              <a:gd name="connsiteX5" fmla="*/ 0 w 4206240"/>
-              <a:gd name="connsiteY5" fmla="*/ 27772 h 27772"/>
-              <a:gd name="connsiteX6" fmla="*/ 0 w 4206240"/>
-              <a:gd name="connsiteY6" fmla="*/ 340 h 27772"/>
-              <a:gd name="connsiteX0" fmla="*/ 0 w 4207827"/>
-              <a:gd name="connsiteY0" fmla="*/ 13040 h 27772"/>
-              <a:gd name="connsiteX1" fmla="*/ 2083565 w 4207827"/>
-              <a:gd name="connsiteY1" fmla="*/ 0 h 27772"/>
-              <a:gd name="connsiteX2" fmla="*/ 4207827 w 4207827"/>
-              <a:gd name="connsiteY2" fmla="*/ 340 h 27772"/>
-              <a:gd name="connsiteX3" fmla="*/ 4207827 w 4207827"/>
-              <a:gd name="connsiteY3" fmla="*/ 27772 h 27772"/>
-              <a:gd name="connsiteX4" fmla="*/ 2081977 w 4207827"/>
-              <a:gd name="connsiteY4" fmla="*/ 26988 h 27772"/>
-              <a:gd name="connsiteX5" fmla="*/ 1587 w 4207827"/>
-              <a:gd name="connsiteY5" fmla="*/ 27772 h 27772"/>
-              <a:gd name="connsiteX6" fmla="*/ 0 w 4207827"/>
-              <a:gd name="connsiteY6" fmla="*/ 13040 h 27772"/>
-              <a:gd name="connsiteX0" fmla="*/ 0 w 4207827"/>
-              <a:gd name="connsiteY0" fmla="*/ 13040 h 27772"/>
-              <a:gd name="connsiteX1" fmla="*/ 2083565 w 4207827"/>
-              <a:gd name="connsiteY1" fmla="*/ 0 h 27772"/>
-              <a:gd name="connsiteX2" fmla="*/ 4207827 w 4207827"/>
-              <a:gd name="connsiteY2" fmla="*/ 340 h 27772"/>
-              <a:gd name="connsiteX3" fmla="*/ 4207827 w 4207827"/>
-              <a:gd name="connsiteY3" fmla="*/ 27772 h 27772"/>
-              <a:gd name="connsiteX4" fmla="*/ 2081977 w 4207827"/>
-              <a:gd name="connsiteY4" fmla="*/ 26988 h 27772"/>
-              <a:gd name="connsiteX5" fmla="*/ 1587 w 4207827"/>
-              <a:gd name="connsiteY5" fmla="*/ 18247 h 27772"/>
-              <a:gd name="connsiteX6" fmla="*/ 0 w 4207827"/>
-              <a:gd name="connsiteY6" fmla="*/ 13040 h 27772"/>
-              <a:gd name="connsiteX0" fmla="*/ 0 w 4207827"/>
-              <a:gd name="connsiteY0" fmla="*/ 13040 h 27772"/>
-              <a:gd name="connsiteX1" fmla="*/ 2083565 w 4207827"/>
-              <a:gd name="connsiteY1" fmla="*/ 0 h 27772"/>
-              <a:gd name="connsiteX2" fmla="*/ 4207827 w 4207827"/>
-              <a:gd name="connsiteY2" fmla="*/ 9865 h 27772"/>
-              <a:gd name="connsiteX3" fmla="*/ 4207827 w 4207827"/>
-              <a:gd name="connsiteY3" fmla="*/ 27772 h 27772"/>
-              <a:gd name="connsiteX4" fmla="*/ 2081977 w 4207827"/>
-              <a:gd name="connsiteY4" fmla="*/ 26988 h 27772"/>
-              <a:gd name="connsiteX5" fmla="*/ 1587 w 4207827"/>
-              <a:gd name="connsiteY5" fmla="*/ 18247 h 27772"/>
-              <a:gd name="connsiteX6" fmla="*/ 0 w 4207827"/>
-              <a:gd name="connsiteY6" fmla="*/ 13040 h 27772"/>
-              <a:gd name="connsiteX0" fmla="*/ 0 w 4209415"/>
-              <a:gd name="connsiteY0" fmla="*/ 13040 h 26988"/>
-              <a:gd name="connsiteX1" fmla="*/ 2083565 w 4209415"/>
-              <a:gd name="connsiteY1" fmla="*/ 0 h 26988"/>
-              <a:gd name="connsiteX2" fmla="*/ 4207827 w 4209415"/>
-              <a:gd name="connsiteY2" fmla="*/ 9865 h 26988"/>
-              <a:gd name="connsiteX3" fmla="*/ 4209415 w 4209415"/>
-              <a:gd name="connsiteY3" fmla="*/ 18247 h 26988"/>
-              <a:gd name="connsiteX4" fmla="*/ 2081977 w 4209415"/>
-              <a:gd name="connsiteY4" fmla="*/ 26988 h 26988"/>
-              <a:gd name="connsiteX5" fmla="*/ 1587 w 4209415"/>
-              <a:gd name="connsiteY5" fmla="*/ 18247 h 26988"/>
-              <a:gd name="connsiteX6" fmla="*/ 0 w 4209415"/>
-              <a:gd name="connsiteY6" fmla="*/ 13040 h 26988"/>
-              <a:gd name="connsiteX0" fmla="*/ 0 w 4209415"/>
-              <a:gd name="connsiteY0" fmla="*/ 13040 h 26988"/>
-              <a:gd name="connsiteX1" fmla="*/ 2083565 w 4209415"/>
-              <a:gd name="connsiteY1" fmla="*/ 0 h 26988"/>
-              <a:gd name="connsiteX2" fmla="*/ 4207827 w 4209415"/>
-              <a:gd name="connsiteY2" fmla="*/ 9865 h 26988"/>
-              <a:gd name="connsiteX3" fmla="*/ 4209415 w 4209415"/>
-              <a:gd name="connsiteY3" fmla="*/ 18247 h 26988"/>
-              <a:gd name="connsiteX4" fmla="*/ 3477391 w 4209415"/>
-              <a:gd name="connsiteY4" fmla="*/ 25400 h 26988"/>
-              <a:gd name="connsiteX5" fmla="*/ 2081977 w 4209415"/>
-              <a:gd name="connsiteY5" fmla="*/ 26988 h 26988"/>
-              <a:gd name="connsiteX6" fmla="*/ 1587 w 4209415"/>
-              <a:gd name="connsiteY6" fmla="*/ 18247 h 26988"/>
-              <a:gd name="connsiteX7" fmla="*/ 0 w 4209415"/>
-              <a:gd name="connsiteY7" fmla="*/ 13040 h 26988"/>
-              <a:gd name="connsiteX0" fmla="*/ 0 w 4209415"/>
-              <a:gd name="connsiteY0" fmla="*/ 13040 h 26988"/>
-              <a:gd name="connsiteX1" fmla="*/ 2083565 w 4209415"/>
-              <a:gd name="connsiteY1" fmla="*/ 0 h 26988"/>
-              <a:gd name="connsiteX2" fmla="*/ 4207827 w 4209415"/>
-              <a:gd name="connsiteY2" fmla="*/ 9865 h 26988"/>
-              <a:gd name="connsiteX3" fmla="*/ 4209415 w 4209415"/>
-              <a:gd name="connsiteY3" fmla="*/ 18247 h 26988"/>
-              <a:gd name="connsiteX4" fmla="*/ 3477391 w 4209415"/>
-              <a:gd name="connsiteY4" fmla="*/ 25400 h 26988"/>
-              <a:gd name="connsiteX5" fmla="*/ 2081977 w 4209415"/>
-              <a:gd name="connsiteY5" fmla="*/ 26988 h 26988"/>
-              <a:gd name="connsiteX6" fmla="*/ 616716 w 4209415"/>
-              <a:gd name="connsiteY6" fmla="*/ 23813 h 26988"/>
-              <a:gd name="connsiteX7" fmla="*/ 1587 w 4209415"/>
-              <a:gd name="connsiteY7" fmla="*/ 18247 h 26988"/>
-              <a:gd name="connsiteX8" fmla="*/ 0 w 4209415"/>
-              <a:gd name="connsiteY8" fmla="*/ 13040 h 26988"/>
-            </a:gdLst>
-            <a:ahLst/>
-            <a:cxnLst>
-              <a:cxn ang="0">
-                <a:pos x="connsiteX0" y="connsiteY0"/>
-              </a:cxn>
-              <a:cxn ang="0">
-                <a:pos x="connsiteX1" y="connsiteY1"/>
-              </a:cxn>
-              <a:cxn ang="0">
-                <a:pos x="connsiteX2" y="connsiteY2"/>
-              </a:cxn>
-              <a:cxn ang="0">
-                <a:pos x="connsiteX3" y="connsiteY3"/>
-              </a:cxn>
-              <a:cxn ang="0">
-                <a:pos x="connsiteX4" y="connsiteY4"/>
-              </a:cxn>
-              <a:cxn ang="0">
-                <a:pos x="connsiteX5" y="connsiteY5"/>
-              </a:cxn>
-              <a:cxn ang="0">
-                <a:pos x="connsiteX6" y="connsiteY6"/>
-              </a:cxn>
-              <a:cxn ang="0">
-                <a:pos x="connsiteX7" y="connsiteY7"/>
-              </a:cxn>
-              <a:cxn ang="0">
-                <a:pos x="connsiteX8" y="connsiteY8"/>
-              </a:cxn>
-            </a:cxnLst>
-            <a:rect l="l" t="t" r="r" b="b"/>
-            <a:pathLst>
-              <a:path w="4209415" h="26988">
-                <a:moveTo>
-                  <a:pt x="0" y="13040"/>
-                </a:moveTo>
-                <a:lnTo>
-                  <a:pt x="2083565" y="0"/>
-                </a:lnTo>
-                <a:lnTo>
-                  <a:pt x="4207827" y="9865"/>
-                </a:lnTo>
-                <a:lnTo>
-                  <a:pt x="4209415" y="18247"/>
-                </a:lnTo>
-                <a:lnTo>
-                  <a:pt x="3477391" y="25400"/>
-                </a:lnTo>
-                <a:lnTo>
-                  <a:pt x="2081977" y="26988"/>
-                </a:lnTo>
-                <a:lnTo>
-                  <a:pt x="616716" y="23813"/>
-                </a:lnTo>
-                <a:lnTo>
-                  <a:pt x="1587" y="18247"/>
-                </a:lnTo>
-                <a:lnTo>
-                  <a:pt x="0" y="13040"/>
-                </a:lnTo>
-                <a:close/>
-              </a:path>
-            </a:pathLst>
-          </a:custGeom>
-          <a:solidFill>
-            <a:schemeClr val="tx1"/>
-          </a:solidFill>
-          <a:ln>
-            <a:noFill/>
-          </a:ln>
-        </p:spPr>
-        <p:style>
-          <a:lnRef idx="2">
-            <a:schemeClr val="accent1">
-              <a:shade val="50000"/>
-            </a:schemeClr>
-          </a:lnRef>
-          <a:fillRef idx="1">
-            <a:schemeClr val="accent1"/>
-          </a:fillRef>
-          <a:effectRef idx="0">
-            <a:schemeClr val="accent1"/>
-          </a:effectRef>
-          <a:fontRef idx="minor">
-            <a:schemeClr val="lt1"/>
-          </a:fontRef>
-        </p:style>
-        <p:txBody>
-          <a:bodyPr rtlCol="0" anchor="ctr"/>
-          <a:lstStyle/>
-          <a:p>
-            <a:pPr algn="ctr"/>
-            <a:endParaRPr lang="en-US"/>
-          </a:p>
-        </p:txBody>
-      </p:sp>
-      <p:sp>
-        <p:nvSpPr>
-          <p:cNvPr id="14" name="TextBox 13"/>
-          <p:cNvSpPr txBox="1"/>
-          <p:nvPr/>
-        </p:nvSpPr>
-        <p:spPr>
-          <a:xfrm>
-            <a:off x="5494868" y="4031481"/>
-            <a:ext cx="1295400" cy="584775"/>
-          </a:xfrm>
-          <a:prstGeom prst="rect">
-            <a:avLst/>
-          </a:prstGeom>
-          <a:noFill/>
-        </p:spPr>
-        <p:txBody>
-          <a:bodyPr wrap="square" rtlCol="0">
-            <a:spAutoFit/>
-          </a:bodyPr>
-          <a:lstStyle/>
-          <a:p>
-            <a:r>
-              <a:rPr lang="zh-CN" altLang="en-US" sz="3200" b="1" dirty="0">
-                <a:latin typeface="Microsoft JhengHei" panose="020B0604030504040204" pitchFamily="34" charset="-120"/>
-                <a:ea typeface="Microsoft JhengHei" panose="020B0604030504040204" pitchFamily="34" charset="-120"/>
-              </a:rPr>
-              <a:t>名称</a:t>
-            </a:r>
-            <a:endParaRPr lang="en-US" sz="3200" b="1" dirty="0">
-              <a:latin typeface="Microsoft JhengHei" panose="020B0604030504040204" pitchFamily="34" charset="-120"/>
-              <a:ea typeface="Microsoft JhengHei" panose="020B0604030504040204" pitchFamily="34" charset="-120"/>
-            </a:endParaRPr>
-          </a:p>
-        </p:txBody>
-      </p:sp>
-      <p:sp>
-        <p:nvSpPr>
-          <p:cNvPr id="15" name="TextBox 14"/>
-          <p:cNvSpPr txBox="1"/>
-          <p:nvPr/>
-        </p:nvSpPr>
-        <p:spPr>
-          <a:xfrm>
-            <a:off x="4250275" y="788778"/>
-            <a:ext cx="1295400" cy="323165"/>
-          </a:xfrm>
-          <a:prstGeom prst="rect">
-            <a:avLst/>
-          </a:prstGeom>
-          <a:noFill/>
-        </p:spPr>
-        <p:txBody>
-          <a:bodyPr wrap="square" rtlCol="0">
-            <a:spAutoFit/>
-          </a:bodyPr>
-          <a:lstStyle/>
-          <a:p>
-            <a:r>
-              <a:rPr lang="zh-CN" altLang="en-US" sz="1500" dirty="0">
-                <a:latin typeface="Microsoft YaHei" panose="020B0503020204020204" pitchFamily="34" charset="-122"/>
-                <a:ea typeface="Microsoft YaHei" panose="020B0503020204020204" pitchFamily="34" charset="-122"/>
-              </a:rPr>
-              <a:t>标签</a:t>
-            </a:r>
-            <a:endParaRPr lang="en-US" sz="1500" dirty="0">
-              <a:latin typeface="Microsoft YaHei" panose="020B0503020204020204" pitchFamily="34" charset="-122"/>
-              <a:ea typeface="Microsoft YaHei" panose="020B0503020204020204" pitchFamily="34" charset="-122"/>
-            </a:endParaRPr>
-          </a:p>
-        </p:txBody>
-      </p:sp>
-      <p:sp>
-        <p:nvSpPr>
-          <p:cNvPr id="16" name="TextBox 15"/>
-          <p:cNvSpPr txBox="1"/>
-          <p:nvPr/>
-        </p:nvSpPr>
-        <p:spPr>
-          <a:xfrm>
-            <a:off x="4229110" y="299346"/>
-            <a:ext cx="1295400" cy="400110"/>
-          </a:xfrm>
-          <a:prstGeom prst="rect">
-            <a:avLst/>
-          </a:prstGeom>
-          <a:noFill/>
-        </p:spPr>
-        <p:txBody>
-          <a:bodyPr wrap="square" rtlCol="0">
-            <a:spAutoFit/>
-          </a:bodyPr>
-          <a:lstStyle/>
-          <a:p>
-            <a:r>
-              <a:rPr lang="zh-CN" altLang="en-US" sz="2000" b="1" dirty="0">
-                <a:latin typeface="Microsoft YaHei" panose="020B0503020204020204" pitchFamily="34" charset="-122"/>
-                <a:ea typeface="Microsoft YaHei" panose="020B0503020204020204" pitchFamily="34" charset="-122"/>
-              </a:rPr>
-              <a:t>类型</a:t>
-            </a:r>
-            <a:endParaRPr lang="en-US" sz="2000" b="1" dirty="0">
-              <a:latin typeface="Microsoft YaHei" panose="020B0503020204020204" pitchFamily="34" charset="-122"/>
-              <a:ea typeface="Microsoft YaHei" panose="020B0503020204020204" pitchFamily="34" charset="-122"/>
-            </a:endParaRPr>
-          </a:p>
-        </p:txBody>
-      </p:sp>
-      <p:sp>
-        <p:nvSpPr>
-          <p:cNvPr id="17" name="TextBox 16"/>
-          <p:cNvSpPr txBox="1"/>
-          <p:nvPr/>
-        </p:nvSpPr>
-        <p:spPr>
-          <a:xfrm>
-            <a:off x="6879167" y="300639"/>
-            <a:ext cx="1267070" cy="369332"/>
-          </a:xfrm>
-          <a:prstGeom prst="rect">
-            <a:avLst/>
-          </a:prstGeom>
-          <a:noFill/>
-        </p:spPr>
-        <p:txBody>
-          <a:bodyPr wrap="square" rtlCol="0">
-            <a:spAutoFit/>
-          </a:bodyPr>
-          <a:lstStyle/>
-          <a:p>
-            <a:r>
-              <a:rPr lang="zh-CN" altLang="en-US" b="1" dirty="0">
-                <a:latin typeface="Microsoft YaHei" panose="020B0503020204020204" pitchFamily="34" charset="-122"/>
-                <a:ea typeface="Microsoft YaHei" panose="020B0503020204020204" pitchFamily="34" charset="-122"/>
-              </a:rPr>
-              <a:t>稀有度</a:t>
-            </a:r>
-            <a:endParaRPr lang="en-US" b="1" dirty="0">
-              <a:latin typeface="Microsoft YaHei" panose="020B0503020204020204" pitchFamily="34" charset="-122"/>
-              <a:ea typeface="Microsoft YaHei" panose="020B0503020204020204" pitchFamily="34" charset="-122"/>
-            </a:endParaRPr>
-          </a:p>
-        </p:txBody>
-      </p:sp>
-      <p:sp>
-        <p:nvSpPr>
-          <p:cNvPr id="18" name="TextBox 17"/>
-          <p:cNvSpPr txBox="1"/>
-          <p:nvPr/>
-        </p:nvSpPr>
-        <p:spPr>
-          <a:xfrm>
-            <a:off x="4272047" y="4698365"/>
-            <a:ext cx="1295400" cy="307777"/>
-          </a:xfrm>
-          <a:prstGeom prst="rect">
-            <a:avLst/>
-          </a:prstGeom>
-          <a:noFill/>
-        </p:spPr>
-        <p:txBody>
-          <a:bodyPr wrap="square" rtlCol="0">
-            <a:spAutoFit/>
-          </a:bodyPr>
-          <a:lstStyle/>
-          <a:p>
-            <a:r>
-              <a:rPr lang="zh-CN" altLang="en-US" sz="1400" dirty="0">
-                <a:latin typeface="Microsoft YaHei" panose="020B0503020204020204" pitchFamily="34" charset="-122"/>
-                <a:ea typeface="Microsoft YaHei" panose="020B0503020204020204" pitchFamily="34" charset="-122"/>
-              </a:rPr>
-              <a:t>介绍</a:t>
-            </a:r>
-            <a:endParaRPr lang="en-US" sz="1400" dirty="0">
-              <a:latin typeface="Microsoft YaHei" panose="020B0503020204020204" pitchFamily="34" charset="-122"/>
-              <a:ea typeface="Microsoft YaHei" panose="020B0503020204020204" pitchFamily="34" charset="-122"/>
-            </a:endParaRPr>
-          </a:p>
-        </p:txBody>
-      </p:sp>
-      <p:sp>
-        <p:nvSpPr>
-          <p:cNvPr id="19" name="TextBox 18"/>
-          <p:cNvSpPr txBox="1"/>
-          <p:nvPr/>
-        </p:nvSpPr>
-        <p:spPr>
-          <a:xfrm>
-            <a:off x="4272047" y="5442125"/>
-            <a:ext cx="1295400" cy="307777"/>
-          </a:xfrm>
-          <a:prstGeom prst="rect">
-            <a:avLst/>
-          </a:prstGeom>
-          <a:noFill/>
-        </p:spPr>
-        <p:txBody>
-          <a:bodyPr wrap="square" rtlCol="0">
-            <a:spAutoFit/>
-          </a:bodyPr>
-          <a:lstStyle/>
-          <a:p>
-            <a:r>
-              <a:rPr lang="zh-CN" altLang="en-US" sz="1400" dirty="0">
-                <a:latin typeface="Microsoft YaHei" panose="020B0503020204020204" pitchFamily="34" charset="-122"/>
-                <a:ea typeface="Microsoft YaHei" panose="020B0503020204020204" pitchFamily="34" charset="-122"/>
-              </a:rPr>
-              <a:t>效果</a:t>
-            </a:r>
-            <a:endParaRPr lang="en-US" sz="1400" dirty="0">
-              <a:latin typeface="Microsoft YaHei" panose="020B0503020204020204" pitchFamily="34" charset="-122"/>
-              <a:ea typeface="Microsoft YaHei" panose="020B0503020204020204" pitchFamily="34" charset="-122"/>
-            </a:endParaRPr>
-          </a:p>
-        </p:txBody>
-      </p:sp>
       <p:pic>
         <p:nvPicPr>
           <p:cNvPr id="23" name="Picture 22"/>
@@ -4170,7 +3058,7 @@
         </p:blipFill>
         <p:spPr>
           <a:xfrm>
-            <a:off x="9106818" y="-1478017"/>
+            <a:off x="13008258" y="0"/>
             <a:ext cx="4854356" cy="6858000"/>
           </a:xfrm>
           <a:prstGeom prst="rect">
@@ -4183,218 +3071,1405 @@
           </a:ln>
         </p:spPr>
       </p:pic>
-      <p:sp>
-        <p:nvSpPr>
-          <p:cNvPr id="24" name="Rounded Rectangle 23"/>
-          <p:cNvSpPr/>
+      <p:grpSp>
+        <p:nvGrpSpPr>
+          <p:cNvPr id="2" name="组合 1">
+            <a:extLst>
+              <a:ext uri="{FF2B5EF4-FFF2-40B4-BE49-F238E27FC236}">
+                <a16:creationId xmlns:a16="http://schemas.microsoft.com/office/drawing/2014/main" id="{8F1C0A87-BD65-4AF9-8B6E-CD1DCC667FA4}"/>
+              </a:ext>
+            </a:extLst>
+          </p:cNvPr>
+          <p:cNvGrpSpPr>
+            <a:grpSpLocks/>
+          </p:cNvGrpSpPr>
           <p:nvPr/>
-        </p:nvSpPr>
-        <p:spPr>
+        </p:nvGrpSpPr>
+        <p:grpSpPr>
           <a:xfrm>
-            <a:off x="3893132" y="173605"/>
-            <a:ext cx="4208716" cy="6248056"/>
+            <a:off x="3887022" y="173605"/>
+            <a:ext cx="3240000" cy="5400000"/>
+            <a:chOff x="3887022" y="173605"/>
+            <a:chExt cx="4259215" cy="6248056"/>
           </a:xfrm>
-          <a:prstGeom prst="roundRect">
-            <a:avLst>
-              <a:gd name="adj" fmla="val 2325"/>
-            </a:avLst>
-          </a:prstGeom>
-          <a:noFill/>
-          <a:ln w="12700">
+        </p:grpSpPr>
+        <p:sp>
+          <p:nvSpPr>
+            <p:cNvPr id="8" name="Rectangle 7"/>
+            <p:cNvSpPr/>
+            <p:nvPr/>
+          </p:nvSpPr>
+          <p:spPr>
+            <a:xfrm>
+              <a:off x="3887022" y="723900"/>
+              <a:ext cx="4209415" cy="26988"/>
+            </a:xfrm>
+            <a:custGeom>
+              <a:avLst/>
+              <a:gdLst>
+                <a:gd name="connsiteX0" fmla="*/ 0 w 4206240"/>
+                <a:gd name="connsiteY0" fmla="*/ 0 h 27432"/>
+                <a:gd name="connsiteX1" fmla="*/ 4206240 w 4206240"/>
+                <a:gd name="connsiteY1" fmla="*/ 0 h 27432"/>
+                <a:gd name="connsiteX2" fmla="*/ 4206240 w 4206240"/>
+                <a:gd name="connsiteY2" fmla="*/ 27432 h 27432"/>
+                <a:gd name="connsiteX3" fmla="*/ 0 w 4206240"/>
+                <a:gd name="connsiteY3" fmla="*/ 27432 h 27432"/>
+                <a:gd name="connsiteX4" fmla="*/ 0 w 4206240"/>
+                <a:gd name="connsiteY4" fmla="*/ 0 h 27432"/>
+                <a:gd name="connsiteX0" fmla="*/ 0 w 4206240"/>
+                <a:gd name="connsiteY0" fmla="*/ 340 h 27772"/>
+                <a:gd name="connsiteX1" fmla="*/ 2081978 w 4206240"/>
+                <a:gd name="connsiteY1" fmla="*/ 0 h 27772"/>
+                <a:gd name="connsiteX2" fmla="*/ 4206240 w 4206240"/>
+                <a:gd name="connsiteY2" fmla="*/ 340 h 27772"/>
+                <a:gd name="connsiteX3" fmla="*/ 4206240 w 4206240"/>
+                <a:gd name="connsiteY3" fmla="*/ 27772 h 27772"/>
+                <a:gd name="connsiteX4" fmla="*/ 0 w 4206240"/>
+                <a:gd name="connsiteY4" fmla="*/ 27772 h 27772"/>
+                <a:gd name="connsiteX5" fmla="*/ 0 w 4206240"/>
+                <a:gd name="connsiteY5" fmla="*/ 340 h 27772"/>
+                <a:gd name="connsiteX0" fmla="*/ 0 w 4206240"/>
+                <a:gd name="connsiteY0" fmla="*/ 340 h 27772"/>
+                <a:gd name="connsiteX1" fmla="*/ 2081978 w 4206240"/>
+                <a:gd name="connsiteY1" fmla="*/ 0 h 27772"/>
+                <a:gd name="connsiteX2" fmla="*/ 4206240 w 4206240"/>
+                <a:gd name="connsiteY2" fmla="*/ 340 h 27772"/>
+                <a:gd name="connsiteX3" fmla="*/ 4206240 w 4206240"/>
+                <a:gd name="connsiteY3" fmla="*/ 27772 h 27772"/>
+                <a:gd name="connsiteX4" fmla="*/ 2080390 w 4206240"/>
+                <a:gd name="connsiteY4" fmla="*/ 26988 h 27772"/>
+                <a:gd name="connsiteX5" fmla="*/ 0 w 4206240"/>
+                <a:gd name="connsiteY5" fmla="*/ 27772 h 27772"/>
+                <a:gd name="connsiteX6" fmla="*/ 0 w 4206240"/>
+                <a:gd name="connsiteY6" fmla="*/ 340 h 27772"/>
+                <a:gd name="connsiteX0" fmla="*/ 0 w 4207827"/>
+                <a:gd name="connsiteY0" fmla="*/ 13040 h 27772"/>
+                <a:gd name="connsiteX1" fmla="*/ 2083565 w 4207827"/>
+                <a:gd name="connsiteY1" fmla="*/ 0 h 27772"/>
+                <a:gd name="connsiteX2" fmla="*/ 4207827 w 4207827"/>
+                <a:gd name="connsiteY2" fmla="*/ 340 h 27772"/>
+                <a:gd name="connsiteX3" fmla="*/ 4207827 w 4207827"/>
+                <a:gd name="connsiteY3" fmla="*/ 27772 h 27772"/>
+                <a:gd name="connsiteX4" fmla="*/ 2081977 w 4207827"/>
+                <a:gd name="connsiteY4" fmla="*/ 26988 h 27772"/>
+                <a:gd name="connsiteX5" fmla="*/ 1587 w 4207827"/>
+                <a:gd name="connsiteY5" fmla="*/ 27772 h 27772"/>
+                <a:gd name="connsiteX6" fmla="*/ 0 w 4207827"/>
+                <a:gd name="connsiteY6" fmla="*/ 13040 h 27772"/>
+                <a:gd name="connsiteX0" fmla="*/ 0 w 4207827"/>
+                <a:gd name="connsiteY0" fmla="*/ 13040 h 27772"/>
+                <a:gd name="connsiteX1" fmla="*/ 2083565 w 4207827"/>
+                <a:gd name="connsiteY1" fmla="*/ 0 h 27772"/>
+                <a:gd name="connsiteX2" fmla="*/ 4207827 w 4207827"/>
+                <a:gd name="connsiteY2" fmla="*/ 340 h 27772"/>
+                <a:gd name="connsiteX3" fmla="*/ 4207827 w 4207827"/>
+                <a:gd name="connsiteY3" fmla="*/ 27772 h 27772"/>
+                <a:gd name="connsiteX4" fmla="*/ 2081977 w 4207827"/>
+                <a:gd name="connsiteY4" fmla="*/ 26988 h 27772"/>
+                <a:gd name="connsiteX5" fmla="*/ 1587 w 4207827"/>
+                <a:gd name="connsiteY5" fmla="*/ 18247 h 27772"/>
+                <a:gd name="connsiteX6" fmla="*/ 0 w 4207827"/>
+                <a:gd name="connsiteY6" fmla="*/ 13040 h 27772"/>
+                <a:gd name="connsiteX0" fmla="*/ 0 w 4207827"/>
+                <a:gd name="connsiteY0" fmla="*/ 13040 h 27772"/>
+                <a:gd name="connsiteX1" fmla="*/ 2083565 w 4207827"/>
+                <a:gd name="connsiteY1" fmla="*/ 0 h 27772"/>
+                <a:gd name="connsiteX2" fmla="*/ 4207827 w 4207827"/>
+                <a:gd name="connsiteY2" fmla="*/ 9865 h 27772"/>
+                <a:gd name="connsiteX3" fmla="*/ 4207827 w 4207827"/>
+                <a:gd name="connsiteY3" fmla="*/ 27772 h 27772"/>
+                <a:gd name="connsiteX4" fmla="*/ 2081977 w 4207827"/>
+                <a:gd name="connsiteY4" fmla="*/ 26988 h 27772"/>
+                <a:gd name="connsiteX5" fmla="*/ 1587 w 4207827"/>
+                <a:gd name="connsiteY5" fmla="*/ 18247 h 27772"/>
+                <a:gd name="connsiteX6" fmla="*/ 0 w 4207827"/>
+                <a:gd name="connsiteY6" fmla="*/ 13040 h 27772"/>
+                <a:gd name="connsiteX0" fmla="*/ 0 w 4209415"/>
+                <a:gd name="connsiteY0" fmla="*/ 13040 h 26988"/>
+                <a:gd name="connsiteX1" fmla="*/ 2083565 w 4209415"/>
+                <a:gd name="connsiteY1" fmla="*/ 0 h 26988"/>
+                <a:gd name="connsiteX2" fmla="*/ 4207827 w 4209415"/>
+                <a:gd name="connsiteY2" fmla="*/ 9865 h 26988"/>
+                <a:gd name="connsiteX3" fmla="*/ 4209415 w 4209415"/>
+                <a:gd name="connsiteY3" fmla="*/ 18247 h 26988"/>
+                <a:gd name="connsiteX4" fmla="*/ 2081977 w 4209415"/>
+                <a:gd name="connsiteY4" fmla="*/ 26988 h 26988"/>
+                <a:gd name="connsiteX5" fmla="*/ 1587 w 4209415"/>
+                <a:gd name="connsiteY5" fmla="*/ 18247 h 26988"/>
+                <a:gd name="connsiteX6" fmla="*/ 0 w 4209415"/>
+                <a:gd name="connsiteY6" fmla="*/ 13040 h 26988"/>
+                <a:gd name="connsiteX0" fmla="*/ 0 w 4209415"/>
+                <a:gd name="connsiteY0" fmla="*/ 13040 h 26988"/>
+                <a:gd name="connsiteX1" fmla="*/ 2083565 w 4209415"/>
+                <a:gd name="connsiteY1" fmla="*/ 0 h 26988"/>
+                <a:gd name="connsiteX2" fmla="*/ 4207827 w 4209415"/>
+                <a:gd name="connsiteY2" fmla="*/ 9865 h 26988"/>
+                <a:gd name="connsiteX3" fmla="*/ 4209415 w 4209415"/>
+                <a:gd name="connsiteY3" fmla="*/ 18247 h 26988"/>
+                <a:gd name="connsiteX4" fmla="*/ 3477391 w 4209415"/>
+                <a:gd name="connsiteY4" fmla="*/ 25400 h 26988"/>
+                <a:gd name="connsiteX5" fmla="*/ 2081977 w 4209415"/>
+                <a:gd name="connsiteY5" fmla="*/ 26988 h 26988"/>
+                <a:gd name="connsiteX6" fmla="*/ 1587 w 4209415"/>
+                <a:gd name="connsiteY6" fmla="*/ 18247 h 26988"/>
+                <a:gd name="connsiteX7" fmla="*/ 0 w 4209415"/>
+                <a:gd name="connsiteY7" fmla="*/ 13040 h 26988"/>
+                <a:gd name="connsiteX0" fmla="*/ 0 w 4209415"/>
+                <a:gd name="connsiteY0" fmla="*/ 13040 h 26988"/>
+                <a:gd name="connsiteX1" fmla="*/ 2083565 w 4209415"/>
+                <a:gd name="connsiteY1" fmla="*/ 0 h 26988"/>
+                <a:gd name="connsiteX2" fmla="*/ 4207827 w 4209415"/>
+                <a:gd name="connsiteY2" fmla="*/ 9865 h 26988"/>
+                <a:gd name="connsiteX3" fmla="*/ 4209415 w 4209415"/>
+                <a:gd name="connsiteY3" fmla="*/ 18247 h 26988"/>
+                <a:gd name="connsiteX4" fmla="*/ 3477391 w 4209415"/>
+                <a:gd name="connsiteY4" fmla="*/ 25400 h 26988"/>
+                <a:gd name="connsiteX5" fmla="*/ 2081977 w 4209415"/>
+                <a:gd name="connsiteY5" fmla="*/ 26988 h 26988"/>
+                <a:gd name="connsiteX6" fmla="*/ 616716 w 4209415"/>
+                <a:gd name="connsiteY6" fmla="*/ 23813 h 26988"/>
+                <a:gd name="connsiteX7" fmla="*/ 1587 w 4209415"/>
+                <a:gd name="connsiteY7" fmla="*/ 18247 h 26988"/>
+                <a:gd name="connsiteX8" fmla="*/ 0 w 4209415"/>
+                <a:gd name="connsiteY8" fmla="*/ 13040 h 26988"/>
+              </a:gdLst>
+              <a:ahLst/>
+              <a:cxnLst>
+                <a:cxn ang="0">
+                  <a:pos x="connsiteX0" y="connsiteY0"/>
+                </a:cxn>
+                <a:cxn ang="0">
+                  <a:pos x="connsiteX1" y="connsiteY1"/>
+                </a:cxn>
+                <a:cxn ang="0">
+                  <a:pos x="connsiteX2" y="connsiteY2"/>
+                </a:cxn>
+                <a:cxn ang="0">
+                  <a:pos x="connsiteX3" y="connsiteY3"/>
+                </a:cxn>
+                <a:cxn ang="0">
+                  <a:pos x="connsiteX4" y="connsiteY4"/>
+                </a:cxn>
+                <a:cxn ang="0">
+                  <a:pos x="connsiteX5" y="connsiteY5"/>
+                </a:cxn>
+                <a:cxn ang="0">
+                  <a:pos x="connsiteX6" y="connsiteY6"/>
+                </a:cxn>
+                <a:cxn ang="0">
+                  <a:pos x="connsiteX7" y="connsiteY7"/>
+                </a:cxn>
+                <a:cxn ang="0">
+                  <a:pos x="connsiteX8" y="connsiteY8"/>
+                </a:cxn>
+              </a:cxnLst>
+              <a:rect l="l" t="t" r="r" b="b"/>
+              <a:pathLst>
+                <a:path w="4209415" h="26988">
+                  <a:moveTo>
+                    <a:pt x="0" y="13040"/>
+                  </a:moveTo>
+                  <a:lnTo>
+                    <a:pt x="2083565" y="0"/>
+                  </a:lnTo>
+                  <a:lnTo>
+                    <a:pt x="4207827" y="9865"/>
+                  </a:lnTo>
+                  <a:lnTo>
+                    <a:pt x="4209415" y="18247"/>
+                  </a:lnTo>
+                  <a:lnTo>
+                    <a:pt x="3477391" y="25400"/>
+                  </a:lnTo>
+                  <a:lnTo>
+                    <a:pt x="2081977" y="26988"/>
+                  </a:lnTo>
+                  <a:lnTo>
+                    <a:pt x="616716" y="23813"/>
+                  </a:lnTo>
+                  <a:lnTo>
+                    <a:pt x="1587" y="18247"/>
+                  </a:lnTo>
+                  <a:lnTo>
+                    <a:pt x="0" y="13040"/>
+                  </a:lnTo>
+                  <a:close/>
+                </a:path>
+              </a:pathLst>
+            </a:custGeom>
             <a:solidFill>
               <a:schemeClr val="tx1"/>
             </a:solidFill>
-          </a:ln>
-          <a:effectLst>
-            <a:outerShdw blurRad="215900" dist="76200" dir="3000000" algn="tl" rotWithShape="0">
-              <a:schemeClr val="tx1"/>
-            </a:outerShdw>
-          </a:effectLst>
-        </p:spPr>
-        <p:style>
-          <a:lnRef idx="2">
-            <a:schemeClr val="accent1">
-              <a:shade val="50000"/>
-            </a:schemeClr>
-          </a:lnRef>
-          <a:fillRef idx="1">
-            <a:schemeClr val="accent1"/>
-          </a:fillRef>
-          <a:effectRef idx="0">
-            <a:schemeClr val="accent1"/>
-          </a:effectRef>
-          <a:fontRef idx="minor">
-            <a:schemeClr val="lt1"/>
-          </a:fontRef>
-        </p:style>
-        <p:txBody>
-          <a:bodyPr rtlCol="0" anchor="ctr"/>
-          <a:lstStyle/>
-          <a:p>
-            <a:pPr algn="ctr"/>
-            <a:endParaRPr lang="en-US"/>
-          </a:p>
-        </p:txBody>
-      </p:sp>
-      <p:sp>
-        <p:nvSpPr>
-          <p:cNvPr id="26" name="Rounded Rectangle 25"/>
-          <p:cNvSpPr/>
-          <p:nvPr/>
-        </p:nvSpPr>
-        <p:spPr>
-          <a:xfrm>
-            <a:off x="3894787" y="173605"/>
-            <a:ext cx="4208716" cy="6248056"/>
-          </a:xfrm>
-          <a:prstGeom prst="roundRect">
-            <a:avLst>
-              <a:gd name="adj" fmla="val 2325"/>
-            </a:avLst>
-          </a:prstGeom>
-          <a:noFill/>
-          <a:ln w="12700">
+            <a:ln>
+              <a:noFill/>
+            </a:ln>
+          </p:spPr>
+          <p:style>
+            <a:lnRef idx="2">
+              <a:schemeClr val="accent1">
+                <a:shade val="50000"/>
+              </a:schemeClr>
+            </a:lnRef>
+            <a:fillRef idx="1">
+              <a:schemeClr val="accent1"/>
+            </a:fillRef>
+            <a:effectRef idx="0">
+              <a:schemeClr val="accent1"/>
+            </a:effectRef>
+            <a:fontRef idx="minor">
+              <a:schemeClr val="lt1"/>
+            </a:fontRef>
+          </p:style>
+          <p:txBody>
+            <a:bodyPr rtlCol="0" anchor="ctr"/>
+            <a:lstStyle/>
+            <a:p>
+              <a:pPr algn="ctr"/>
+              <a:endParaRPr lang="en-US"/>
+            </a:p>
+          </p:txBody>
+        </p:sp>
+        <p:sp>
+          <p:nvSpPr>
+            <p:cNvPr id="9" name="Rectangle 7"/>
+            <p:cNvSpPr/>
+            <p:nvPr/>
+          </p:nvSpPr>
+          <p:spPr>
+            <a:xfrm>
+              <a:off x="3891470" y="1142440"/>
+              <a:ext cx="4209415" cy="9144"/>
+            </a:xfrm>
+            <a:custGeom>
+              <a:avLst/>
+              <a:gdLst>
+                <a:gd name="connsiteX0" fmla="*/ 0 w 4206240"/>
+                <a:gd name="connsiteY0" fmla="*/ 0 h 27432"/>
+                <a:gd name="connsiteX1" fmla="*/ 4206240 w 4206240"/>
+                <a:gd name="connsiteY1" fmla="*/ 0 h 27432"/>
+                <a:gd name="connsiteX2" fmla="*/ 4206240 w 4206240"/>
+                <a:gd name="connsiteY2" fmla="*/ 27432 h 27432"/>
+                <a:gd name="connsiteX3" fmla="*/ 0 w 4206240"/>
+                <a:gd name="connsiteY3" fmla="*/ 27432 h 27432"/>
+                <a:gd name="connsiteX4" fmla="*/ 0 w 4206240"/>
+                <a:gd name="connsiteY4" fmla="*/ 0 h 27432"/>
+                <a:gd name="connsiteX0" fmla="*/ 0 w 4206240"/>
+                <a:gd name="connsiteY0" fmla="*/ 340 h 27772"/>
+                <a:gd name="connsiteX1" fmla="*/ 2081978 w 4206240"/>
+                <a:gd name="connsiteY1" fmla="*/ 0 h 27772"/>
+                <a:gd name="connsiteX2" fmla="*/ 4206240 w 4206240"/>
+                <a:gd name="connsiteY2" fmla="*/ 340 h 27772"/>
+                <a:gd name="connsiteX3" fmla="*/ 4206240 w 4206240"/>
+                <a:gd name="connsiteY3" fmla="*/ 27772 h 27772"/>
+                <a:gd name="connsiteX4" fmla="*/ 0 w 4206240"/>
+                <a:gd name="connsiteY4" fmla="*/ 27772 h 27772"/>
+                <a:gd name="connsiteX5" fmla="*/ 0 w 4206240"/>
+                <a:gd name="connsiteY5" fmla="*/ 340 h 27772"/>
+                <a:gd name="connsiteX0" fmla="*/ 0 w 4206240"/>
+                <a:gd name="connsiteY0" fmla="*/ 340 h 27772"/>
+                <a:gd name="connsiteX1" fmla="*/ 2081978 w 4206240"/>
+                <a:gd name="connsiteY1" fmla="*/ 0 h 27772"/>
+                <a:gd name="connsiteX2" fmla="*/ 4206240 w 4206240"/>
+                <a:gd name="connsiteY2" fmla="*/ 340 h 27772"/>
+                <a:gd name="connsiteX3" fmla="*/ 4206240 w 4206240"/>
+                <a:gd name="connsiteY3" fmla="*/ 27772 h 27772"/>
+                <a:gd name="connsiteX4" fmla="*/ 2080390 w 4206240"/>
+                <a:gd name="connsiteY4" fmla="*/ 26988 h 27772"/>
+                <a:gd name="connsiteX5" fmla="*/ 0 w 4206240"/>
+                <a:gd name="connsiteY5" fmla="*/ 27772 h 27772"/>
+                <a:gd name="connsiteX6" fmla="*/ 0 w 4206240"/>
+                <a:gd name="connsiteY6" fmla="*/ 340 h 27772"/>
+                <a:gd name="connsiteX0" fmla="*/ 0 w 4207827"/>
+                <a:gd name="connsiteY0" fmla="*/ 13040 h 27772"/>
+                <a:gd name="connsiteX1" fmla="*/ 2083565 w 4207827"/>
+                <a:gd name="connsiteY1" fmla="*/ 0 h 27772"/>
+                <a:gd name="connsiteX2" fmla="*/ 4207827 w 4207827"/>
+                <a:gd name="connsiteY2" fmla="*/ 340 h 27772"/>
+                <a:gd name="connsiteX3" fmla="*/ 4207827 w 4207827"/>
+                <a:gd name="connsiteY3" fmla="*/ 27772 h 27772"/>
+                <a:gd name="connsiteX4" fmla="*/ 2081977 w 4207827"/>
+                <a:gd name="connsiteY4" fmla="*/ 26988 h 27772"/>
+                <a:gd name="connsiteX5" fmla="*/ 1587 w 4207827"/>
+                <a:gd name="connsiteY5" fmla="*/ 27772 h 27772"/>
+                <a:gd name="connsiteX6" fmla="*/ 0 w 4207827"/>
+                <a:gd name="connsiteY6" fmla="*/ 13040 h 27772"/>
+                <a:gd name="connsiteX0" fmla="*/ 0 w 4207827"/>
+                <a:gd name="connsiteY0" fmla="*/ 13040 h 27772"/>
+                <a:gd name="connsiteX1" fmla="*/ 2083565 w 4207827"/>
+                <a:gd name="connsiteY1" fmla="*/ 0 h 27772"/>
+                <a:gd name="connsiteX2" fmla="*/ 4207827 w 4207827"/>
+                <a:gd name="connsiteY2" fmla="*/ 340 h 27772"/>
+                <a:gd name="connsiteX3" fmla="*/ 4207827 w 4207827"/>
+                <a:gd name="connsiteY3" fmla="*/ 27772 h 27772"/>
+                <a:gd name="connsiteX4" fmla="*/ 2081977 w 4207827"/>
+                <a:gd name="connsiteY4" fmla="*/ 26988 h 27772"/>
+                <a:gd name="connsiteX5" fmla="*/ 1587 w 4207827"/>
+                <a:gd name="connsiteY5" fmla="*/ 18247 h 27772"/>
+                <a:gd name="connsiteX6" fmla="*/ 0 w 4207827"/>
+                <a:gd name="connsiteY6" fmla="*/ 13040 h 27772"/>
+                <a:gd name="connsiteX0" fmla="*/ 0 w 4207827"/>
+                <a:gd name="connsiteY0" fmla="*/ 13040 h 27772"/>
+                <a:gd name="connsiteX1" fmla="*/ 2083565 w 4207827"/>
+                <a:gd name="connsiteY1" fmla="*/ 0 h 27772"/>
+                <a:gd name="connsiteX2" fmla="*/ 4207827 w 4207827"/>
+                <a:gd name="connsiteY2" fmla="*/ 9865 h 27772"/>
+                <a:gd name="connsiteX3" fmla="*/ 4207827 w 4207827"/>
+                <a:gd name="connsiteY3" fmla="*/ 27772 h 27772"/>
+                <a:gd name="connsiteX4" fmla="*/ 2081977 w 4207827"/>
+                <a:gd name="connsiteY4" fmla="*/ 26988 h 27772"/>
+                <a:gd name="connsiteX5" fmla="*/ 1587 w 4207827"/>
+                <a:gd name="connsiteY5" fmla="*/ 18247 h 27772"/>
+                <a:gd name="connsiteX6" fmla="*/ 0 w 4207827"/>
+                <a:gd name="connsiteY6" fmla="*/ 13040 h 27772"/>
+                <a:gd name="connsiteX0" fmla="*/ 0 w 4209415"/>
+                <a:gd name="connsiteY0" fmla="*/ 13040 h 26988"/>
+                <a:gd name="connsiteX1" fmla="*/ 2083565 w 4209415"/>
+                <a:gd name="connsiteY1" fmla="*/ 0 h 26988"/>
+                <a:gd name="connsiteX2" fmla="*/ 4207827 w 4209415"/>
+                <a:gd name="connsiteY2" fmla="*/ 9865 h 26988"/>
+                <a:gd name="connsiteX3" fmla="*/ 4209415 w 4209415"/>
+                <a:gd name="connsiteY3" fmla="*/ 18247 h 26988"/>
+                <a:gd name="connsiteX4" fmla="*/ 2081977 w 4209415"/>
+                <a:gd name="connsiteY4" fmla="*/ 26988 h 26988"/>
+                <a:gd name="connsiteX5" fmla="*/ 1587 w 4209415"/>
+                <a:gd name="connsiteY5" fmla="*/ 18247 h 26988"/>
+                <a:gd name="connsiteX6" fmla="*/ 0 w 4209415"/>
+                <a:gd name="connsiteY6" fmla="*/ 13040 h 26988"/>
+                <a:gd name="connsiteX0" fmla="*/ 0 w 4209415"/>
+                <a:gd name="connsiteY0" fmla="*/ 13040 h 26988"/>
+                <a:gd name="connsiteX1" fmla="*/ 2083565 w 4209415"/>
+                <a:gd name="connsiteY1" fmla="*/ 0 h 26988"/>
+                <a:gd name="connsiteX2" fmla="*/ 4207827 w 4209415"/>
+                <a:gd name="connsiteY2" fmla="*/ 9865 h 26988"/>
+                <a:gd name="connsiteX3" fmla="*/ 4209415 w 4209415"/>
+                <a:gd name="connsiteY3" fmla="*/ 18247 h 26988"/>
+                <a:gd name="connsiteX4" fmla="*/ 3477391 w 4209415"/>
+                <a:gd name="connsiteY4" fmla="*/ 25400 h 26988"/>
+                <a:gd name="connsiteX5" fmla="*/ 2081977 w 4209415"/>
+                <a:gd name="connsiteY5" fmla="*/ 26988 h 26988"/>
+                <a:gd name="connsiteX6" fmla="*/ 1587 w 4209415"/>
+                <a:gd name="connsiteY6" fmla="*/ 18247 h 26988"/>
+                <a:gd name="connsiteX7" fmla="*/ 0 w 4209415"/>
+                <a:gd name="connsiteY7" fmla="*/ 13040 h 26988"/>
+                <a:gd name="connsiteX0" fmla="*/ 0 w 4209415"/>
+                <a:gd name="connsiteY0" fmla="*/ 13040 h 26988"/>
+                <a:gd name="connsiteX1" fmla="*/ 2083565 w 4209415"/>
+                <a:gd name="connsiteY1" fmla="*/ 0 h 26988"/>
+                <a:gd name="connsiteX2" fmla="*/ 4207827 w 4209415"/>
+                <a:gd name="connsiteY2" fmla="*/ 9865 h 26988"/>
+                <a:gd name="connsiteX3" fmla="*/ 4209415 w 4209415"/>
+                <a:gd name="connsiteY3" fmla="*/ 18247 h 26988"/>
+                <a:gd name="connsiteX4" fmla="*/ 3477391 w 4209415"/>
+                <a:gd name="connsiteY4" fmla="*/ 25400 h 26988"/>
+                <a:gd name="connsiteX5" fmla="*/ 2081977 w 4209415"/>
+                <a:gd name="connsiteY5" fmla="*/ 26988 h 26988"/>
+                <a:gd name="connsiteX6" fmla="*/ 616716 w 4209415"/>
+                <a:gd name="connsiteY6" fmla="*/ 23813 h 26988"/>
+                <a:gd name="connsiteX7" fmla="*/ 1587 w 4209415"/>
+                <a:gd name="connsiteY7" fmla="*/ 18247 h 26988"/>
+                <a:gd name="connsiteX8" fmla="*/ 0 w 4209415"/>
+                <a:gd name="connsiteY8" fmla="*/ 13040 h 26988"/>
+              </a:gdLst>
+              <a:ahLst/>
+              <a:cxnLst>
+                <a:cxn ang="0">
+                  <a:pos x="connsiteX0" y="connsiteY0"/>
+                </a:cxn>
+                <a:cxn ang="0">
+                  <a:pos x="connsiteX1" y="connsiteY1"/>
+                </a:cxn>
+                <a:cxn ang="0">
+                  <a:pos x="connsiteX2" y="connsiteY2"/>
+                </a:cxn>
+                <a:cxn ang="0">
+                  <a:pos x="connsiteX3" y="connsiteY3"/>
+                </a:cxn>
+                <a:cxn ang="0">
+                  <a:pos x="connsiteX4" y="connsiteY4"/>
+                </a:cxn>
+                <a:cxn ang="0">
+                  <a:pos x="connsiteX5" y="connsiteY5"/>
+                </a:cxn>
+                <a:cxn ang="0">
+                  <a:pos x="connsiteX6" y="connsiteY6"/>
+                </a:cxn>
+                <a:cxn ang="0">
+                  <a:pos x="connsiteX7" y="connsiteY7"/>
+                </a:cxn>
+                <a:cxn ang="0">
+                  <a:pos x="connsiteX8" y="connsiteY8"/>
+                </a:cxn>
+              </a:cxnLst>
+              <a:rect l="l" t="t" r="r" b="b"/>
+              <a:pathLst>
+                <a:path w="4209415" h="26988">
+                  <a:moveTo>
+                    <a:pt x="0" y="13040"/>
+                  </a:moveTo>
+                  <a:lnTo>
+                    <a:pt x="2083565" y="0"/>
+                  </a:lnTo>
+                  <a:lnTo>
+                    <a:pt x="4207827" y="9865"/>
+                  </a:lnTo>
+                  <a:lnTo>
+                    <a:pt x="4209415" y="18247"/>
+                  </a:lnTo>
+                  <a:lnTo>
+                    <a:pt x="3477391" y="25400"/>
+                  </a:lnTo>
+                  <a:lnTo>
+                    <a:pt x="2081977" y="26988"/>
+                  </a:lnTo>
+                  <a:lnTo>
+                    <a:pt x="616716" y="23813"/>
+                  </a:lnTo>
+                  <a:lnTo>
+                    <a:pt x="1587" y="18247"/>
+                  </a:lnTo>
+                  <a:lnTo>
+                    <a:pt x="0" y="13040"/>
+                  </a:lnTo>
+                  <a:close/>
+                </a:path>
+              </a:pathLst>
+            </a:custGeom>
             <a:solidFill>
               <a:schemeClr val="tx1"/>
             </a:solidFill>
-          </a:ln>
-          <a:effectLst>
-            <a:outerShdw blurRad="215900" dist="76200" dir="3000000" algn="tl" rotWithShape="0">
-              <a:schemeClr val="tx1"/>
-            </a:outerShdw>
-          </a:effectLst>
-        </p:spPr>
-        <p:style>
-          <a:lnRef idx="2">
-            <a:schemeClr val="accent1">
-              <a:shade val="50000"/>
-            </a:schemeClr>
-          </a:lnRef>
-          <a:fillRef idx="1">
-            <a:schemeClr val="accent1"/>
-          </a:fillRef>
-          <a:effectRef idx="0">
-            <a:schemeClr val="accent1"/>
-          </a:effectRef>
-          <a:fontRef idx="minor">
-            <a:schemeClr val="lt1"/>
-          </a:fontRef>
-        </p:style>
-        <p:txBody>
-          <a:bodyPr rtlCol="0" anchor="ctr"/>
-          <a:lstStyle/>
-          <a:p>
-            <a:pPr algn="ctr"/>
-            <a:endParaRPr lang="en-US"/>
-          </a:p>
-        </p:txBody>
-      </p:sp>
-      <p:sp>
-        <p:nvSpPr>
-          <p:cNvPr id="27" name="Rounded Rectangle 26"/>
-          <p:cNvSpPr/>
-          <p:nvPr/>
-        </p:nvSpPr>
-        <p:spPr>
-          <a:xfrm>
-            <a:off x="3887417" y="173605"/>
-            <a:ext cx="4208716" cy="6248056"/>
-          </a:xfrm>
-          <a:prstGeom prst="roundRect">
-            <a:avLst>
-              <a:gd name="adj" fmla="val 2325"/>
-            </a:avLst>
-          </a:prstGeom>
-          <a:noFill/>
-          <a:ln w="12700">
+            <a:ln>
+              <a:noFill/>
+            </a:ln>
+          </p:spPr>
+          <p:style>
+            <a:lnRef idx="2">
+              <a:schemeClr val="accent1">
+                <a:shade val="50000"/>
+              </a:schemeClr>
+            </a:lnRef>
+            <a:fillRef idx="1">
+              <a:schemeClr val="accent1"/>
+            </a:fillRef>
+            <a:effectRef idx="0">
+              <a:schemeClr val="accent1"/>
+            </a:effectRef>
+            <a:fontRef idx="minor">
+              <a:schemeClr val="lt1"/>
+            </a:fontRef>
+          </p:style>
+          <p:txBody>
+            <a:bodyPr rtlCol="0" anchor="ctr"/>
+            <a:lstStyle/>
+            <a:p>
+              <a:pPr algn="ctr"/>
+              <a:endParaRPr lang="en-US"/>
+            </a:p>
+          </p:txBody>
+        </p:sp>
+        <p:sp>
+          <p:nvSpPr>
+            <p:cNvPr id="10" name="Rectangle 7"/>
+            <p:cNvSpPr/>
+            <p:nvPr/>
+          </p:nvSpPr>
+          <p:spPr>
+            <a:xfrm>
+              <a:off x="3891262" y="4635481"/>
+              <a:ext cx="4209415" cy="26988"/>
+            </a:xfrm>
+            <a:custGeom>
+              <a:avLst/>
+              <a:gdLst>
+                <a:gd name="connsiteX0" fmla="*/ 0 w 4206240"/>
+                <a:gd name="connsiteY0" fmla="*/ 0 h 27432"/>
+                <a:gd name="connsiteX1" fmla="*/ 4206240 w 4206240"/>
+                <a:gd name="connsiteY1" fmla="*/ 0 h 27432"/>
+                <a:gd name="connsiteX2" fmla="*/ 4206240 w 4206240"/>
+                <a:gd name="connsiteY2" fmla="*/ 27432 h 27432"/>
+                <a:gd name="connsiteX3" fmla="*/ 0 w 4206240"/>
+                <a:gd name="connsiteY3" fmla="*/ 27432 h 27432"/>
+                <a:gd name="connsiteX4" fmla="*/ 0 w 4206240"/>
+                <a:gd name="connsiteY4" fmla="*/ 0 h 27432"/>
+                <a:gd name="connsiteX0" fmla="*/ 0 w 4206240"/>
+                <a:gd name="connsiteY0" fmla="*/ 340 h 27772"/>
+                <a:gd name="connsiteX1" fmla="*/ 2081978 w 4206240"/>
+                <a:gd name="connsiteY1" fmla="*/ 0 h 27772"/>
+                <a:gd name="connsiteX2" fmla="*/ 4206240 w 4206240"/>
+                <a:gd name="connsiteY2" fmla="*/ 340 h 27772"/>
+                <a:gd name="connsiteX3" fmla="*/ 4206240 w 4206240"/>
+                <a:gd name="connsiteY3" fmla="*/ 27772 h 27772"/>
+                <a:gd name="connsiteX4" fmla="*/ 0 w 4206240"/>
+                <a:gd name="connsiteY4" fmla="*/ 27772 h 27772"/>
+                <a:gd name="connsiteX5" fmla="*/ 0 w 4206240"/>
+                <a:gd name="connsiteY5" fmla="*/ 340 h 27772"/>
+                <a:gd name="connsiteX0" fmla="*/ 0 w 4206240"/>
+                <a:gd name="connsiteY0" fmla="*/ 340 h 27772"/>
+                <a:gd name="connsiteX1" fmla="*/ 2081978 w 4206240"/>
+                <a:gd name="connsiteY1" fmla="*/ 0 h 27772"/>
+                <a:gd name="connsiteX2" fmla="*/ 4206240 w 4206240"/>
+                <a:gd name="connsiteY2" fmla="*/ 340 h 27772"/>
+                <a:gd name="connsiteX3" fmla="*/ 4206240 w 4206240"/>
+                <a:gd name="connsiteY3" fmla="*/ 27772 h 27772"/>
+                <a:gd name="connsiteX4" fmla="*/ 2080390 w 4206240"/>
+                <a:gd name="connsiteY4" fmla="*/ 26988 h 27772"/>
+                <a:gd name="connsiteX5" fmla="*/ 0 w 4206240"/>
+                <a:gd name="connsiteY5" fmla="*/ 27772 h 27772"/>
+                <a:gd name="connsiteX6" fmla="*/ 0 w 4206240"/>
+                <a:gd name="connsiteY6" fmla="*/ 340 h 27772"/>
+                <a:gd name="connsiteX0" fmla="*/ 0 w 4207827"/>
+                <a:gd name="connsiteY0" fmla="*/ 13040 h 27772"/>
+                <a:gd name="connsiteX1" fmla="*/ 2083565 w 4207827"/>
+                <a:gd name="connsiteY1" fmla="*/ 0 h 27772"/>
+                <a:gd name="connsiteX2" fmla="*/ 4207827 w 4207827"/>
+                <a:gd name="connsiteY2" fmla="*/ 340 h 27772"/>
+                <a:gd name="connsiteX3" fmla="*/ 4207827 w 4207827"/>
+                <a:gd name="connsiteY3" fmla="*/ 27772 h 27772"/>
+                <a:gd name="connsiteX4" fmla="*/ 2081977 w 4207827"/>
+                <a:gd name="connsiteY4" fmla="*/ 26988 h 27772"/>
+                <a:gd name="connsiteX5" fmla="*/ 1587 w 4207827"/>
+                <a:gd name="connsiteY5" fmla="*/ 27772 h 27772"/>
+                <a:gd name="connsiteX6" fmla="*/ 0 w 4207827"/>
+                <a:gd name="connsiteY6" fmla="*/ 13040 h 27772"/>
+                <a:gd name="connsiteX0" fmla="*/ 0 w 4207827"/>
+                <a:gd name="connsiteY0" fmla="*/ 13040 h 27772"/>
+                <a:gd name="connsiteX1" fmla="*/ 2083565 w 4207827"/>
+                <a:gd name="connsiteY1" fmla="*/ 0 h 27772"/>
+                <a:gd name="connsiteX2" fmla="*/ 4207827 w 4207827"/>
+                <a:gd name="connsiteY2" fmla="*/ 340 h 27772"/>
+                <a:gd name="connsiteX3" fmla="*/ 4207827 w 4207827"/>
+                <a:gd name="connsiteY3" fmla="*/ 27772 h 27772"/>
+                <a:gd name="connsiteX4" fmla="*/ 2081977 w 4207827"/>
+                <a:gd name="connsiteY4" fmla="*/ 26988 h 27772"/>
+                <a:gd name="connsiteX5" fmla="*/ 1587 w 4207827"/>
+                <a:gd name="connsiteY5" fmla="*/ 18247 h 27772"/>
+                <a:gd name="connsiteX6" fmla="*/ 0 w 4207827"/>
+                <a:gd name="connsiteY6" fmla="*/ 13040 h 27772"/>
+                <a:gd name="connsiteX0" fmla="*/ 0 w 4207827"/>
+                <a:gd name="connsiteY0" fmla="*/ 13040 h 27772"/>
+                <a:gd name="connsiteX1" fmla="*/ 2083565 w 4207827"/>
+                <a:gd name="connsiteY1" fmla="*/ 0 h 27772"/>
+                <a:gd name="connsiteX2" fmla="*/ 4207827 w 4207827"/>
+                <a:gd name="connsiteY2" fmla="*/ 9865 h 27772"/>
+                <a:gd name="connsiteX3" fmla="*/ 4207827 w 4207827"/>
+                <a:gd name="connsiteY3" fmla="*/ 27772 h 27772"/>
+                <a:gd name="connsiteX4" fmla="*/ 2081977 w 4207827"/>
+                <a:gd name="connsiteY4" fmla="*/ 26988 h 27772"/>
+                <a:gd name="connsiteX5" fmla="*/ 1587 w 4207827"/>
+                <a:gd name="connsiteY5" fmla="*/ 18247 h 27772"/>
+                <a:gd name="connsiteX6" fmla="*/ 0 w 4207827"/>
+                <a:gd name="connsiteY6" fmla="*/ 13040 h 27772"/>
+                <a:gd name="connsiteX0" fmla="*/ 0 w 4209415"/>
+                <a:gd name="connsiteY0" fmla="*/ 13040 h 26988"/>
+                <a:gd name="connsiteX1" fmla="*/ 2083565 w 4209415"/>
+                <a:gd name="connsiteY1" fmla="*/ 0 h 26988"/>
+                <a:gd name="connsiteX2" fmla="*/ 4207827 w 4209415"/>
+                <a:gd name="connsiteY2" fmla="*/ 9865 h 26988"/>
+                <a:gd name="connsiteX3" fmla="*/ 4209415 w 4209415"/>
+                <a:gd name="connsiteY3" fmla="*/ 18247 h 26988"/>
+                <a:gd name="connsiteX4" fmla="*/ 2081977 w 4209415"/>
+                <a:gd name="connsiteY4" fmla="*/ 26988 h 26988"/>
+                <a:gd name="connsiteX5" fmla="*/ 1587 w 4209415"/>
+                <a:gd name="connsiteY5" fmla="*/ 18247 h 26988"/>
+                <a:gd name="connsiteX6" fmla="*/ 0 w 4209415"/>
+                <a:gd name="connsiteY6" fmla="*/ 13040 h 26988"/>
+                <a:gd name="connsiteX0" fmla="*/ 0 w 4209415"/>
+                <a:gd name="connsiteY0" fmla="*/ 13040 h 26988"/>
+                <a:gd name="connsiteX1" fmla="*/ 2083565 w 4209415"/>
+                <a:gd name="connsiteY1" fmla="*/ 0 h 26988"/>
+                <a:gd name="connsiteX2" fmla="*/ 4207827 w 4209415"/>
+                <a:gd name="connsiteY2" fmla="*/ 9865 h 26988"/>
+                <a:gd name="connsiteX3" fmla="*/ 4209415 w 4209415"/>
+                <a:gd name="connsiteY3" fmla="*/ 18247 h 26988"/>
+                <a:gd name="connsiteX4" fmla="*/ 3477391 w 4209415"/>
+                <a:gd name="connsiteY4" fmla="*/ 25400 h 26988"/>
+                <a:gd name="connsiteX5" fmla="*/ 2081977 w 4209415"/>
+                <a:gd name="connsiteY5" fmla="*/ 26988 h 26988"/>
+                <a:gd name="connsiteX6" fmla="*/ 1587 w 4209415"/>
+                <a:gd name="connsiteY6" fmla="*/ 18247 h 26988"/>
+                <a:gd name="connsiteX7" fmla="*/ 0 w 4209415"/>
+                <a:gd name="connsiteY7" fmla="*/ 13040 h 26988"/>
+                <a:gd name="connsiteX0" fmla="*/ 0 w 4209415"/>
+                <a:gd name="connsiteY0" fmla="*/ 13040 h 26988"/>
+                <a:gd name="connsiteX1" fmla="*/ 2083565 w 4209415"/>
+                <a:gd name="connsiteY1" fmla="*/ 0 h 26988"/>
+                <a:gd name="connsiteX2" fmla="*/ 4207827 w 4209415"/>
+                <a:gd name="connsiteY2" fmla="*/ 9865 h 26988"/>
+                <a:gd name="connsiteX3" fmla="*/ 4209415 w 4209415"/>
+                <a:gd name="connsiteY3" fmla="*/ 18247 h 26988"/>
+                <a:gd name="connsiteX4" fmla="*/ 3477391 w 4209415"/>
+                <a:gd name="connsiteY4" fmla="*/ 25400 h 26988"/>
+                <a:gd name="connsiteX5" fmla="*/ 2081977 w 4209415"/>
+                <a:gd name="connsiteY5" fmla="*/ 26988 h 26988"/>
+                <a:gd name="connsiteX6" fmla="*/ 616716 w 4209415"/>
+                <a:gd name="connsiteY6" fmla="*/ 23813 h 26988"/>
+                <a:gd name="connsiteX7" fmla="*/ 1587 w 4209415"/>
+                <a:gd name="connsiteY7" fmla="*/ 18247 h 26988"/>
+                <a:gd name="connsiteX8" fmla="*/ 0 w 4209415"/>
+                <a:gd name="connsiteY8" fmla="*/ 13040 h 26988"/>
+              </a:gdLst>
+              <a:ahLst/>
+              <a:cxnLst>
+                <a:cxn ang="0">
+                  <a:pos x="connsiteX0" y="connsiteY0"/>
+                </a:cxn>
+                <a:cxn ang="0">
+                  <a:pos x="connsiteX1" y="connsiteY1"/>
+                </a:cxn>
+                <a:cxn ang="0">
+                  <a:pos x="connsiteX2" y="connsiteY2"/>
+                </a:cxn>
+                <a:cxn ang="0">
+                  <a:pos x="connsiteX3" y="connsiteY3"/>
+                </a:cxn>
+                <a:cxn ang="0">
+                  <a:pos x="connsiteX4" y="connsiteY4"/>
+                </a:cxn>
+                <a:cxn ang="0">
+                  <a:pos x="connsiteX5" y="connsiteY5"/>
+                </a:cxn>
+                <a:cxn ang="0">
+                  <a:pos x="connsiteX6" y="connsiteY6"/>
+                </a:cxn>
+                <a:cxn ang="0">
+                  <a:pos x="connsiteX7" y="connsiteY7"/>
+                </a:cxn>
+                <a:cxn ang="0">
+                  <a:pos x="connsiteX8" y="connsiteY8"/>
+                </a:cxn>
+              </a:cxnLst>
+              <a:rect l="l" t="t" r="r" b="b"/>
+              <a:pathLst>
+                <a:path w="4209415" h="26988">
+                  <a:moveTo>
+                    <a:pt x="0" y="13040"/>
+                  </a:moveTo>
+                  <a:lnTo>
+                    <a:pt x="2083565" y="0"/>
+                  </a:lnTo>
+                  <a:lnTo>
+                    <a:pt x="4207827" y="9865"/>
+                  </a:lnTo>
+                  <a:lnTo>
+                    <a:pt x="4209415" y="18247"/>
+                  </a:lnTo>
+                  <a:lnTo>
+                    <a:pt x="3477391" y="25400"/>
+                  </a:lnTo>
+                  <a:lnTo>
+                    <a:pt x="2081977" y="26988"/>
+                  </a:lnTo>
+                  <a:lnTo>
+                    <a:pt x="616716" y="23813"/>
+                  </a:lnTo>
+                  <a:lnTo>
+                    <a:pt x="1587" y="18247"/>
+                  </a:lnTo>
+                  <a:lnTo>
+                    <a:pt x="0" y="13040"/>
+                  </a:lnTo>
+                  <a:close/>
+                </a:path>
+              </a:pathLst>
+            </a:custGeom>
             <a:solidFill>
               <a:schemeClr val="tx1"/>
             </a:solidFill>
-          </a:ln>
-          <a:effectLst>
-            <a:outerShdw blurRad="215900" dist="76200" dir="3000000" algn="tl" rotWithShape="0">
-              <a:schemeClr val="tx1"/>
-            </a:outerShdw>
-          </a:effectLst>
-        </p:spPr>
-        <p:style>
-          <a:lnRef idx="2">
-            <a:schemeClr val="accent1">
-              <a:shade val="50000"/>
-            </a:schemeClr>
-          </a:lnRef>
-          <a:fillRef idx="1">
-            <a:schemeClr val="accent1"/>
-          </a:fillRef>
-          <a:effectRef idx="0">
-            <a:schemeClr val="accent1"/>
-          </a:effectRef>
-          <a:fontRef idx="minor">
-            <a:schemeClr val="lt1"/>
-          </a:fontRef>
-        </p:style>
-        <p:txBody>
-          <a:bodyPr rtlCol="0" anchor="ctr"/>
-          <a:lstStyle/>
-          <a:p>
-            <a:pPr algn="ctr"/>
-            <a:endParaRPr lang="en-US"/>
-          </a:p>
-        </p:txBody>
-      </p:sp>
-      <p:sp>
-        <p:nvSpPr>
-          <p:cNvPr id="28" name="Rounded Rectangle 27"/>
-          <p:cNvSpPr/>
-          <p:nvPr/>
-        </p:nvSpPr>
-        <p:spPr>
-          <a:xfrm>
-            <a:off x="3893960" y="173605"/>
-            <a:ext cx="4208716" cy="6248056"/>
-          </a:xfrm>
-          <a:prstGeom prst="roundRect">
-            <a:avLst>
-              <a:gd name="adj" fmla="val 2325"/>
-            </a:avLst>
-          </a:prstGeom>
-          <a:noFill/>
-          <a:ln w="12700">
+            <a:ln>
+              <a:noFill/>
+            </a:ln>
+          </p:spPr>
+          <p:style>
+            <a:lnRef idx="2">
+              <a:schemeClr val="accent1">
+                <a:shade val="50000"/>
+              </a:schemeClr>
+            </a:lnRef>
+            <a:fillRef idx="1">
+              <a:schemeClr val="accent1"/>
+            </a:fillRef>
+            <a:effectRef idx="0">
+              <a:schemeClr val="accent1"/>
+            </a:effectRef>
+            <a:fontRef idx="minor">
+              <a:schemeClr val="lt1"/>
+            </a:fontRef>
+          </p:style>
+          <p:txBody>
+            <a:bodyPr rtlCol="0" anchor="ctr"/>
+            <a:lstStyle/>
+            <a:p>
+              <a:pPr algn="ctr"/>
+              <a:endParaRPr lang="en-US"/>
+            </a:p>
+          </p:txBody>
+        </p:sp>
+        <p:sp>
+          <p:nvSpPr>
+            <p:cNvPr id="11" name="Rectangle 7"/>
+            <p:cNvSpPr/>
+            <p:nvPr/>
+          </p:nvSpPr>
+          <p:spPr>
+            <a:xfrm>
+              <a:off x="3891477" y="5379983"/>
+              <a:ext cx="4209415" cy="9144"/>
+            </a:xfrm>
+            <a:custGeom>
+              <a:avLst/>
+              <a:gdLst>
+                <a:gd name="connsiteX0" fmla="*/ 0 w 4206240"/>
+                <a:gd name="connsiteY0" fmla="*/ 0 h 27432"/>
+                <a:gd name="connsiteX1" fmla="*/ 4206240 w 4206240"/>
+                <a:gd name="connsiteY1" fmla="*/ 0 h 27432"/>
+                <a:gd name="connsiteX2" fmla="*/ 4206240 w 4206240"/>
+                <a:gd name="connsiteY2" fmla="*/ 27432 h 27432"/>
+                <a:gd name="connsiteX3" fmla="*/ 0 w 4206240"/>
+                <a:gd name="connsiteY3" fmla="*/ 27432 h 27432"/>
+                <a:gd name="connsiteX4" fmla="*/ 0 w 4206240"/>
+                <a:gd name="connsiteY4" fmla="*/ 0 h 27432"/>
+                <a:gd name="connsiteX0" fmla="*/ 0 w 4206240"/>
+                <a:gd name="connsiteY0" fmla="*/ 340 h 27772"/>
+                <a:gd name="connsiteX1" fmla="*/ 2081978 w 4206240"/>
+                <a:gd name="connsiteY1" fmla="*/ 0 h 27772"/>
+                <a:gd name="connsiteX2" fmla="*/ 4206240 w 4206240"/>
+                <a:gd name="connsiteY2" fmla="*/ 340 h 27772"/>
+                <a:gd name="connsiteX3" fmla="*/ 4206240 w 4206240"/>
+                <a:gd name="connsiteY3" fmla="*/ 27772 h 27772"/>
+                <a:gd name="connsiteX4" fmla="*/ 0 w 4206240"/>
+                <a:gd name="connsiteY4" fmla="*/ 27772 h 27772"/>
+                <a:gd name="connsiteX5" fmla="*/ 0 w 4206240"/>
+                <a:gd name="connsiteY5" fmla="*/ 340 h 27772"/>
+                <a:gd name="connsiteX0" fmla="*/ 0 w 4206240"/>
+                <a:gd name="connsiteY0" fmla="*/ 340 h 27772"/>
+                <a:gd name="connsiteX1" fmla="*/ 2081978 w 4206240"/>
+                <a:gd name="connsiteY1" fmla="*/ 0 h 27772"/>
+                <a:gd name="connsiteX2" fmla="*/ 4206240 w 4206240"/>
+                <a:gd name="connsiteY2" fmla="*/ 340 h 27772"/>
+                <a:gd name="connsiteX3" fmla="*/ 4206240 w 4206240"/>
+                <a:gd name="connsiteY3" fmla="*/ 27772 h 27772"/>
+                <a:gd name="connsiteX4" fmla="*/ 2080390 w 4206240"/>
+                <a:gd name="connsiteY4" fmla="*/ 26988 h 27772"/>
+                <a:gd name="connsiteX5" fmla="*/ 0 w 4206240"/>
+                <a:gd name="connsiteY5" fmla="*/ 27772 h 27772"/>
+                <a:gd name="connsiteX6" fmla="*/ 0 w 4206240"/>
+                <a:gd name="connsiteY6" fmla="*/ 340 h 27772"/>
+                <a:gd name="connsiteX0" fmla="*/ 0 w 4207827"/>
+                <a:gd name="connsiteY0" fmla="*/ 13040 h 27772"/>
+                <a:gd name="connsiteX1" fmla="*/ 2083565 w 4207827"/>
+                <a:gd name="connsiteY1" fmla="*/ 0 h 27772"/>
+                <a:gd name="connsiteX2" fmla="*/ 4207827 w 4207827"/>
+                <a:gd name="connsiteY2" fmla="*/ 340 h 27772"/>
+                <a:gd name="connsiteX3" fmla="*/ 4207827 w 4207827"/>
+                <a:gd name="connsiteY3" fmla="*/ 27772 h 27772"/>
+                <a:gd name="connsiteX4" fmla="*/ 2081977 w 4207827"/>
+                <a:gd name="connsiteY4" fmla="*/ 26988 h 27772"/>
+                <a:gd name="connsiteX5" fmla="*/ 1587 w 4207827"/>
+                <a:gd name="connsiteY5" fmla="*/ 27772 h 27772"/>
+                <a:gd name="connsiteX6" fmla="*/ 0 w 4207827"/>
+                <a:gd name="connsiteY6" fmla="*/ 13040 h 27772"/>
+                <a:gd name="connsiteX0" fmla="*/ 0 w 4207827"/>
+                <a:gd name="connsiteY0" fmla="*/ 13040 h 27772"/>
+                <a:gd name="connsiteX1" fmla="*/ 2083565 w 4207827"/>
+                <a:gd name="connsiteY1" fmla="*/ 0 h 27772"/>
+                <a:gd name="connsiteX2" fmla="*/ 4207827 w 4207827"/>
+                <a:gd name="connsiteY2" fmla="*/ 340 h 27772"/>
+                <a:gd name="connsiteX3" fmla="*/ 4207827 w 4207827"/>
+                <a:gd name="connsiteY3" fmla="*/ 27772 h 27772"/>
+                <a:gd name="connsiteX4" fmla="*/ 2081977 w 4207827"/>
+                <a:gd name="connsiteY4" fmla="*/ 26988 h 27772"/>
+                <a:gd name="connsiteX5" fmla="*/ 1587 w 4207827"/>
+                <a:gd name="connsiteY5" fmla="*/ 18247 h 27772"/>
+                <a:gd name="connsiteX6" fmla="*/ 0 w 4207827"/>
+                <a:gd name="connsiteY6" fmla="*/ 13040 h 27772"/>
+                <a:gd name="connsiteX0" fmla="*/ 0 w 4207827"/>
+                <a:gd name="connsiteY0" fmla="*/ 13040 h 27772"/>
+                <a:gd name="connsiteX1" fmla="*/ 2083565 w 4207827"/>
+                <a:gd name="connsiteY1" fmla="*/ 0 h 27772"/>
+                <a:gd name="connsiteX2" fmla="*/ 4207827 w 4207827"/>
+                <a:gd name="connsiteY2" fmla="*/ 9865 h 27772"/>
+                <a:gd name="connsiteX3" fmla="*/ 4207827 w 4207827"/>
+                <a:gd name="connsiteY3" fmla="*/ 27772 h 27772"/>
+                <a:gd name="connsiteX4" fmla="*/ 2081977 w 4207827"/>
+                <a:gd name="connsiteY4" fmla="*/ 26988 h 27772"/>
+                <a:gd name="connsiteX5" fmla="*/ 1587 w 4207827"/>
+                <a:gd name="connsiteY5" fmla="*/ 18247 h 27772"/>
+                <a:gd name="connsiteX6" fmla="*/ 0 w 4207827"/>
+                <a:gd name="connsiteY6" fmla="*/ 13040 h 27772"/>
+                <a:gd name="connsiteX0" fmla="*/ 0 w 4209415"/>
+                <a:gd name="connsiteY0" fmla="*/ 13040 h 26988"/>
+                <a:gd name="connsiteX1" fmla="*/ 2083565 w 4209415"/>
+                <a:gd name="connsiteY1" fmla="*/ 0 h 26988"/>
+                <a:gd name="connsiteX2" fmla="*/ 4207827 w 4209415"/>
+                <a:gd name="connsiteY2" fmla="*/ 9865 h 26988"/>
+                <a:gd name="connsiteX3" fmla="*/ 4209415 w 4209415"/>
+                <a:gd name="connsiteY3" fmla="*/ 18247 h 26988"/>
+                <a:gd name="connsiteX4" fmla="*/ 2081977 w 4209415"/>
+                <a:gd name="connsiteY4" fmla="*/ 26988 h 26988"/>
+                <a:gd name="connsiteX5" fmla="*/ 1587 w 4209415"/>
+                <a:gd name="connsiteY5" fmla="*/ 18247 h 26988"/>
+                <a:gd name="connsiteX6" fmla="*/ 0 w 4209415"/>
+                <a:gd name="connsiteY6" fmla="*/ 13040 h 26988"/>
+                <a:gd name="connsiteX0" fmla="*/ 0 w 4209415"/>
+                <a:gd name="connsiteY0" fmla="*/ 13040 h 26988"/>
+                <a:gd name="connsiteX1" fmla="*/ 2083565 w 4209415"/>
+                <a:gd name="connsiteY1" fmla="*/ 0 h 26988"/>
+                <a:gd name="connsiteX2" fmla="*/ 4207827 w 4209415"/>
+                <a:gd name="connsiteY2" fmla="*/ 9865 h 26988"/>
+                <a:gd name="connsiteX3" fmla="*/ 4209415 w 4209415"/>
+                <a:gd name="connsiteY3" fmla="*/ 18247 h 26988"/>
+                <a:gd name="connsiteX4" fmla="*/ 3477391 w 4209415"/>
+                <a:gd name="connsiteY4" fmla="*/ 25400 h 26988"/>
+                <a:gd name="connsiteX5" fmla="*/ 2081977 w 4209415"/>
+                <a:gd name="connsiteY5" fmla="*/ 26988 h 26988"/>
+                <a:gd name="connsiteX6" fmla="*/ 1587 w 4209415"/>
+                <a:gd name="connsiteY6" fmla="*/ 18247 h 26988"/>
+                <a:gd name="connsiteX7" fmla="*/ 0 w 4209415"/>
+                <a:gd name="connsiteY7" fmla="*/ 13040 h 26988"/>
+                <a:gd name="connsiteX0" fmla="*/ 0 w 4209415"/>
+                <a:gd name="connsiteY0" fmla="*/ 13040 h 26988"/>
+                <a:gd name="connsiteX1" fmla="*/ 2083565 w 4209415"/>
+                <a:gd name="connsiteY1" fmla="*/ 0 h 26988"/>
+                <a:gd name="connsiteX2" fmla="*/ 4207827 w 4209415"/>
+                <a:gd name="connsiteY2" fmla="*/ 9865 h 26988"/>
+                <a:gd name="connsiteX3" fmla="*/ 4209415 w 4209415"/>
+                <a:gd name="connsiteY3" fmla="*/ 18247 h 26988"/>
+                <a:gd name="connsiteX4" fmla="*/ 3477391 w 4209415"/>
+                <a:gd name="connsiteY4" fmla="*/ 25400 h 26988"/>
+                <a:gd name="connsiteX5" fmla="*/ 2081977 w 4209415"/>
+                <a:gd name="connsiteY5" fmla="*/ 26988 h 26988"/>
+                <a:gd name="connsiteX6" fmla="*/ 616716 w 4209415"/>
+                <a:gd name="connsiteY6" fmla="*/ 23813 h 26988"/>
+                <a:gd name="connsiteX7" fmla="*/ 1587 w 4209415"/>
+                <a:gd name="connsiteY7" fmla="*/ 18247 h 26988"/>
+                <a:gd name="connsiteX8" fmla="*/ 0 w 4209415"/>
+                <a:gd name="connsiteY8" fmla="*/ 13040 h 26988"/>
+              </a:gdLst>
+              <a:ahLst/>
+              <a:cxnLst>
+                <a:cxn ang="0">
+                  <a:pos x="connsiteX0" y="connsiteY0"/>
+                </a:cxn>
+                <a:cxn ang="0">
+                  <a:pos x="connsiteX1" y="connsiteY1"/>
+                </a:cxn>
+                <a:cxn ang="0">
+                  <a:pos x="connsiteX2" y="connsiteY2"/>
+                </a:cxn>
+                <a:cxn ang="0">
+                  <a:pos x="connsiteX3" y="connsiteY3"/>
+                </a:cxn>
+                <a:cxn ang="0">
+                  <a:pos x="connsiteX4" y="connsiteY4"/>
+                </a:cxn>
+                <a:cxn ang="0">
+                  <a:pos x="connsiteX5" y="connsiteY5"/>
+                </a:cxn>
+                <a:cxn ang="0">
+                  <a:pos x="connsiteX6" y="connsiteY6"/>
+                </a:cxn>
+                <a:cxn ang="0">
+                  <a:pos x="connsiteX7" y="connsiteY7"/>
+                </a:cxn>
+                <a:cxn ang="0">
+                  <a:pos x="connsiteX8" y="connsiteY8"/>
+                </a:cxn>
+              </a:cxnLst>
+              <a:rect l="l" t="t" r="r" b="b"/>
+              <a:pathLst>
+                <a:path w="4209415" h="26988">
+                  <a:moveTo>
+                    <a:pt x="0" y="13040"/>
+                  </a:moveTo>
+                  <a:lnTo>
+                    <a:pt x="2083565" y="0"/>
+                  </a:lnTo>
+                  <a:lnTo>
+                    <a:pt x="4207827" y="9865"/>
+                  </a:lnTo>
+                  <a:lnTo>
+                    <a:pt x="4209415" y="18247"/>
+                  </a:lnTo>
+                  <a:lnTo>
+                    <a:pt x="3477391" y="25400"/>
+                  </a:lnTo>
+                  <a:lnTo>
+                    <a:pt x="2081977" y="26988"/>
+                  </a:lnTo>
+                  <a:lnTo>
+                    <a:pt x="616716" y="23813"/>
+                  </a:lnTo>
+                  <a:lnTo>
+                    <a:pt x="1587" y="18247"/>
+                  </a:lnTo>
+                  <a:lnTo>
+                    <a:pt x="0" y="13040"/>
+                  </a:lnTo>
+                  <a:close/>
+                </a:path>
+              </a:pathLst>
+            </a:custGeom>
             <a:solidFill>
               <a:schemeClr val="tx1"/>
             </a:solidFill>
-          </a:ln>
-          <a:effectLst>
-            <a:outerShdw blurRad="215900" dist="76200" dir="3000000" algn="tl" rotWithShape="0">
-              <a:schemeClr val="tx1"/>
-            </a:outerShdw>
-          </a:effectLst>
-        </p:spPr>
-        <p:style>
-          <a:lnRef idx="2">
-            <a:schemeClr val="accent1">
-              <a:shade val="50000"/>
-            </a:schemeClr>
-          </a:lnRef>
-          <a:fillRef idx="1">
-            <a:schemeClr val="accent1"/>
-          </a:fillRef>
-          <a:effectRef idx="0">
-            <a:schemeClr val="accent1"/>
-          </a:effectRef>
-          <a:fontRef idx="minor">
-            <a:schemeClr val="lt1"/>
-          </a:fontRef>
-        </p:style>
-        <p:txBody>
-          <a:bodyPr rtlCol="0" anchor="ctr"/>
-          <a:lstStyle/>
-          <a:p>
-            <a:pPr algn="ctr"/>
-            <a:endParaRPr lang="en-US"/>
-          </a:p>
-        </p:txBody>
-      </p:sp>
+            <a:ln>
+              <a:noFill/>
+            </a:ln>
+          </p:spPr>
+          <p:style>
+            <a:lnRef idx="2">
+              <a:schemeClr val="accent1">
+                <a:shade val="50000"/>
+              </a:schemeClr>
+            </a:lnRef>
+            <a:fillRef idx="1">
+              <a:schemeClr val="accent1"/>
+            </a:fillRef>
+            <a:effectRef idx="0">
+              <a:schemeClr val="accent1"/>
+            </a:effectRef>
+            <a:fontRef idx="minor">
+              <a:schemeClr val="lt1"/>
+            </a:fontRef>
+          </p:style>
+          <p:txBody>
+            <a:bodyPr rtlCol="0" anchor="ctr"/>
+            <a:lstStyle/>
+            <a:p>
+              <a:pPr algn="ctr"/>
+              <a:endParaRPr lang="en-US"/>
+            </a:p>
+          </p:txBody>
+        </p:sp>
+        <p:sp>
+          <p:nvSpPr>
+            <p:cNvPr id="14" name="TextBox 13"/>
+            <p:cNvSpPr txBox="1"/>
+            <p:nvPr/>
+          </p:nvSpPr>
+          <p:spPr>
+            <a:xfrm>
+              <a:off x="5494868" y="4031481"/>
+              <a:ext cx="1295399" cy="534168"/>
+            </a:xfrm>
+            <a:prstGeom prst="rect">
+              <a:avLst/>
+            </a:prstGeom>
+            <a:noFill/>
+          </p:spPr>
+          <p:txBody>
+            <a:bodyPr wrap="square" rtlCol="0">
+              <a:spAutoFit/>
+            </a:bodyPr>
+            <a:lstStyle/>
+            <a:p>
+              <a:r>
+                <a:rPr lang="zh-CN" altLang="en-US" sz="2400" b="1" dirty="0">
+                  <a:latin typeface="Microsoft JhengHei" panose="020B0604030504040204" pitchFamily="34" charset="-120"/>
+                  <a:ea typeface="Microsoft JhengHei" panose="020B0604030504040204" pitchFamily="34" charset="-120"/>
+                </a:rPr>
+                <a:t>名称</a:t>
+              </a:r>
+              <a:endParaRPr lang="en-US" sz="2400" b="1" dirty="0">
+                <a:latin typeface="Microsoft JhengHei" panose="020B0604030504040204" pitchFamily="34" charset="-120"/>
+                <a:ea typeface="Microsoft JhengHei" panose="020B0604030504040204" pitchFamily="34" charset="-120"/>
+              </a:endParaRPr>
+            </a:p>
+          </p:txBody>
+        </p:sp>
+        <p:sp>
+          <p:nvSpPr>
+            <p:cNvPr id="15" name="TextBox 14"/>
+            <p:cNvSpPr txBox="1"/>
+            <p:nvPr/>
+          </p:nvSpPr>
+          <p:spPr>
+            <a:xfrm>
+              <a:off x="4250275" y="788778"/>
+              <a:ext cx="1295400" cy="323165"/>
+            </a:xfrm>
+            <a:prstGeom prst="rect">
+              <a:avLst/>
+            </a:prstGeom>
+            <a:noFill/>
+          </p:spPr>
+          <p:txBody>
+            <a:bodyPr wrap="square" rtlCol="0">
+              <a:spAutoFit/>
+            </a:bodyPr>
+            <a:lstStyle/>
+            <a:p>
+              <a:r>
+                <a:rPr lang="zh-CN" altLang="en-US" sz="1500" dirty="0">
+                  <a:latin typeface="Microsoft YaHei" panose="020B0503020204020204" pitchFamily="34" charset="-122"/>
+                  <a:ea typeface="Microsoft YaHei" panose="020B0503020204020204" pitchFamily="34" charset="-122"/>
+                </a:rPr>
+                <a:t>标签</a:t>
+              </a:r>
+              <a:endParaRPr lang="en-US" sz="1500" dirty="0">
+                <a:latin typeface="Microsoft YaHei" panose="020B0503020204020204" pitchFamily="34" charset="-122"/>
+                <a:ea typeface="Microsoft YaHei" panose="020B0503020204020204" pitchFamily="34" charset="-122"/>
+              </a:endParaRPr>
+            </a:p>
+          </p:txBody>
+        </p:sp>
+        <p:sp>
+          <p:nvSpPr>
+            <p:cNvPr id="16" name="TextBox 15"/>
+            <p:cNvSpPr txBox="1"/>
+            <p:nvPr/>
+          </p:nvSpPr>
+          <p:spPr>
+            <a:xfrm>
+              <a:off x="4229111" y="299346"/>
+              <a:ext cx="1295399" cy="427335"/>
+            </a:xfrm>
+            <a:prstGeom prst="rect">
+              <a:avLst/>
+            </a:prstGeom>
+            <a:noFill/>
+          </p:spPr>
+          <p:txBody>
+            <a:bodyPr wrap="square" rtlCol="0">
+              <a:spAutoFit/>
+            </a:bodyPr>
+            <a:lstStyle/>
+            <a:p>
+              <a:r>
+                <a:rPr lang="zh-CN" altLang="en-US" b="1" dirty="0">
+                  <a:latin typeface="Microsoft YaHei" panose="020B0503020204020204" pitchFamily="34" charset="-122"/>
+                  <a:ea typeface="Microsoft YaHei" panose="020B0503020204020204" pitchFamily="34" charset="-122"/>
+                </a:rPr>
+                <a:t>类型</a:t>
+              </a:r>
+              <a:endParaRPr lang="en-US" b="1" dirty="0">
+                <a:latin typeface="Microsoft YaHei" panose="020B0503020204020204" pitchFamily="34" charset="-122"/>
+                <a:ea typeface="Microsoft YaHei" panose="020B0503020204020204" pitchFamily="34" charset="-122"/>
+              </a:endParaRPr>
+            </a:p>
+          </p:txBody>
+        </p:sp>
+        <p:sp>
+          <p:nvSpPr>
+            <p:cNvPr id="17" name="TextBox 16"/>
+            <p:cNvSpPr txBox="1"/>
+            <p:nvPr/>
+          </p:nvSpPr>
+          <p:spPr>
+            <a:xfrm>
+              <a:off x="6879167" y="300640"/>
+              <a:ext cx="1267070" cy="391723"/>
+            </a:xfrm>
+            <a:prstGeom prst="rect">
+              <a:avLst/>
+            </a:prstGeom>
+            <a:noFill/>
+          </p:spPr>
+          <p:txBody>
+            <a:bodyPr wrap="square" rtlCol="0">
+              <a:spAutoFit/>
+            </a:bodyPr>
+            <a:lstStyle/>
+            <a:p>
+              <a:r>
+                <a:rPr lang="zh-CN" altLang="en-US" sz="1600" b="1" dirty="0">
+                  <a:latin typeface="Microsoft YaHei" panose="020B0503020204020204" pitchFamily="34" charset="-122"/>
+                  <a:ea typeface="Microsoft YaHei" panose="020B0503020204020204" pitchFamily="34" charset="-122"/>
+                </a:rPr>
+                <a:t>稀有度</a:t>
+              </a:r>
+              <a:endParaRPr lang="en-US" sz="1600" b="1" dirty="0">
+                <a:latin typeface="Microsoft YaHei" panose="020B0503020204020204" pitchFamily="34" charset="-122"/>
+                <a:ea typeface="Microsoft YaHei" panose="020B0503020204020204" pitchFamily="34" charset="-122"/>
+              </a:endParaRPr>
+            </a:p>
+          </p:txBody>
+        </p:sp>
+        <p:sp>
+          <p:nvSpPr>
+            <p:cNvPr id="18" name="TextBox 17"/>
+            <p:cNvSpPr txBox="1"/>
+            <p:nvPr/>
+          </p:nvSpPr>
+          <p:spPr>
+            <a:xfrm>
+              <a:off x="4272047" y="4698365"/>
+              <a:ext cx="1295400" cy="307777"/>
+            </a:xfrm>
+            <a:prstGeom prst="rect">
+              <a:avLst/>
+            </a:prstGeom>
+            <a:noFill/>
+          </p:spPr>
+          <p:txBody>
+            <a:bodyPr wrap="square" rtlCol="0">
+              <a:spAutoFit/>
+            </a:bodyPr>
+            <a:lstStyle/>
+            <a:p>
+              <a:r>
+                <a:rPr lang="zh-CN" altLang="en-US" sz="1400" dirty="0">
+                  <a:latin typeface="Microsoft YaHei" panose="020B0503020204020204" pitchFamily="34" charset="-122"/>
+                  <a:ea typeface="Microsoft YaHei" panose="020B0503020204020204" pitchFamily="34" charset="-122"/>
+                </a:rPr>
+                <a:t>介绍</a:t>
+              </a:r>
+              <a:endParaRPr lang="en-US" sz="1400" dirty="0">
+                <a:latin typeface="Microsoft YaHei" panose="020B0503020204020204" pitchFamily="34" charset="-122"/>
+                <a:ea typeface="Microsoft YaHei" panose="020B0503020204020204" pitchFamily="34" charset="-122"/>
+              </a:endParaRPr>
+            </a:p>
+          </p:txBody>
+        </p:sp>
+        <p:sp>
+          <p:nvSpPr>
+            <p:cNvPr id="19" name="TextBox 18"/>
+            <p:cNvSpPr txBox="1"/>
+            <p:nvPr/>
+          </p:nvSpPr>
+          <p:spPr>
+            <a:xfrm>
+              <a:off x="4272047" y="5442125"/>
+              <a:ext cx="1295400" cy="307777"/>
+            </a:xfrm>
+            <a:prstGeom prst="rect">
+              <a:avLst/>
+            </a:prstGeom>
+            <a:noFill/>
+          </p:spPr>
+          <p:txBody>
+            <a:bodyPr wrap="square" rtlCol="0">
+              <a:spAutoFit/>
+            </a:bodyPr>
+            <a:lstStyle/>
+            <a:p>
+              <a:r>
+                <a:rPr lang="zh-CN" altLang="en-US" sz="1400" dirty="0">
+                  <a:latin typeface="Microsoft YaHei" panose="020B0503020204020204" pitchFamily="34" charset="-122"/>
+                  <a:ea typeface="Microsoft YaHei" panose="020B0503020204020204" pitchFamily="34" charset="-122"/>
+                </a:rPr>
+                <a:t>效果</a:t>
+              </a:r>
+              <a:endParaRPr lang="en-US" sz="1400" dirty="0">
+                <a:latin typeface="Microsoft YaHei" panose="020B0503020204020204" pitchFamily="34" charset="-122"/>
+                <a:ea typeface="Microsoft YaHei" panose="020B0503020204020204" pitchFamily="34" charset="-122"/>
+              </a:endParaRPr>
+            </a:p>
+          </p:txBody>
+        </p:sp>
+        <p:sp>
+          <p:nvSpPr>
+            <p:cNvPr id="24" name="Rounded Rectangle 23"/>
+            <p:cNvSpPr/>
+            <p:nvPr/>
+          </p:nvSpPr>
+          <p:spPr>
+            <a:xfrm>
+              <a:off x="3893132" y="173605"/>
+              <a:ext cx="4208716" cy="6248056"/>
+            </a:xfrm>
+            <a:prstGeom prst="roundRect">
+              <a:avLst>
+                <a:gd name="adj" fmla="val 2325"/>
+              </a:avLst>
+            </a:prstGeom>
+            <a:noFill/>
+            <a:ln w="12700">
+              <a:solidFill>
+                <a:schemeClr val="tx1"/>
+              </a:solidFill>
+            </a:ln>
+            <a:effectLst>
+              <a:outerShdw blurRad="215900" dist="76200" dir="3000000" algn="tl" rotWithShape="0">
+                <a:schemeClr val="tx1"/>
+              </a:outerShdw>
+            </a:effectLst>
+          </p:spPr>
+          <p:style>
+            <a:lnRef idx="2">
+              <a:schemeClr val="accent1">
+                <a:shade val="50000"/>
+              </a:schemeClr>
+            </a:lnRef>
+            <a:fillRef idx="1">
+              <a:schemeClr val="accent1"/>
+            </a:fillRef>
+            <a:effectRef idx="0">
+              <a:schemeClr val="accent1"/>
+            </a:effectRef>
+            <a:fontRef idx="minor">
+              <a:schemeClr val="lt1"/>
+            </a:fontRef>
+          </p:style>
+          <p:txBody>
+            <a:bodyPr rtlCol="0" anchor="ctr"/>
+            <a:lstStyle/>
+            <a:p>
+              <a:pPr algn="ctr"/>
+              <a:endParaRPr lang="en-US"/>
+            </a:p>
+          </p:txBody>
+        </p:sp>
+        <p:sp>
+          <p:nvSpPr>
+            <p:cNvPr id="26" name="Rounded Rectangle 25"/>
+            <p:cNvSpPr/>
+            <p:nvPr/>
+          </p:nvSpPr>
+          <p:spPr>
+            <a:xfrm>
+              <a:off x="3894787" y="173605"/>
+              <a:ext cx="4208716" cy="6248056"/>
+            </a:xfrm>
+            <a:prstGeom prst="roundRect">
+              <a:avLst>
+                <a:gd name="adj" fmla="val 2325"/>
+              </a:avLst>
+            </a:prstGeom>
+            <a:noFill/>
+            <a:ln w="12700">
+              <a:solidFill>
+                <a:schemeClr val="tx1"/>
+              </a:solidFill>
+            </a:ln>
+            <a:effectLst>
+              <a:outerShdw blurRad="215900" dist="76200" dir="3000000" algn="tl" rotWithShape="0">
+                <a:schemeClr val="tx1"/>
+              </a:outerShdw>
+            </a:effectLst>
+          </p:spPr>
+          <p:style>
+            <a:lnRef idx="2">
+              <a:schemeClr val="accent1">
+                <a:shade val="50000"/>
+              </a:schemeClr>
+            </a:lnRef>
+            <a:fillRef idx="1">
+              <a:schemeClr val="accent1"/>
+            </a:fillRef>
+            <a:effectRef idx="0">
+              <a:schemeClr val="accent1"/>
+            </a:effectRef>
+            <a:fontRef idx="minor">
+              <a:schemeClr val="lt1"/>
+            </a:fontRef>
+          </p:style>
+          <p:txBody>
+            <a:bodyPr rtlCol="0" anchor="ctr"/>
+            <a:lstStyle/>
+            <a:p>
+              <a:pPr algn="ctr"/>
+              <a:endParaRPr lang="en-US"/>
+            </a:p>
+          </p:txBody>
+        </p:sp>
+        <p:sp>
+          <p:nvSpPr>
+            <p:cNvPr id="27" name="Rounded Rectangle 26"/>
+            <p:cNvSpPr/>
+            <p:nvPr/>
+          </p:nvSpPr>
+          <p:spPr>
+            <a:xfrm>
+              <a:off x="3887417" y="173605"/>
+              <a:ext cx="4208716" cy="6248056"/>
+            </a:xfrm>
+            <a:prstGeom prst="roundRect">
+              <a:avLst>
+                <a:gd name="adj" fmla="val 2325"/>
+              </a:avLst>
+            </a:prstGeom>
+            <a:noFill/>
+            <a:ln w="12700">
+              <a:solidFill>
+                <a:schemeClr val="tx1"/>
+              </a:solidFill>
+            </a:ln>
+            <a:effectLst>
+              <a:outerShdw blurRad="215900" dist="76200" dir="3000000" algn="tl" rotWithShape="0">
+                <a:schemeClr val="tx1"/>
+              </a:outerShdw>
+            </a:effectLst>
+          </p:spPr>
+          <p:style>
+            <a:lnRef idx="2">
+              <a:schemeClr val="accent1">
+                <a:shade val="50000"/>
+              </a:schemeClr>
+            </a:lnRef>
+            <a:fillRef idx="1">
+              <a:schemeClr val="accent1"/>
+            </a:fillRef>
+            <a:effectRef idx="0">
+              <a:schemeClr val="accent1"/>
+            </a:effectRef>
+            <a:fontRef idx="minor">
+              <a:schemeClr val="lt1"/>
+            </a:fontRef>
+          </p:style>
+          <p:txBody>
+            <a:bodyPr rtlCol="0" anchor="ctr"/>
+            <a:lstStyle/>
+            <a:p>
+              <a:pPr algn="ctr"/>
+              <a:endParaRPr lang="en-US"/>
+            </a:p>
+          </p:txBody>
+        </p:sp>
+        <p:sp>
+          <p:nvSpPr>
+            <p:cNvPr id="28" name="Rounded Rectangle 27"/>
+            <p:cNvSpPr/>
+            <p:nvPr/>
+          </p:nvSpPr>
+          <p:spPr>
+            <a:xfrm>
+              <a:off x="3893960" y="173605"/>
+              <a:ext cx="4208716" cy="6248056"/>
+            </a:xfrm>
+            <a:prstGeom prst="roundRect">
+              <a:avLst>
+                <a:gd name="adj" fmla="val 2325"/>
+              </a:avLst>
+            </a:prstGeom>
+            <a:noFill/>
+            <a:ln w="12700">
+              <a:solidFill>
+                <a:schemeClr val="tx1"/>
+              </a:solidFill>
+            </a:ln>
+            <a:effectLst>
+              <a:outerShdw blurRad="215900" dist="76200" dir="3000000" algn="tl" rotWithShape="0">
+                <a:schemeClr val="tx1"/>
+              </a:outerShdw>
+            </a:effectLst>
+          </p:spPr>
+          <p:style>
+            <a:lnRef idx="2">
+              <a:schemeClr val="accent1">
+                <a:shade val="50000"/>
+              </a:schemeClr>
+            </a:lnRef>
+            <a:fillRef idx="1">
+              <a:schemeClr val="accent1"/>
+            </a:fillRef>
+            <a:effectRef idx="0">
+              <a:schemeClr val="accent1"/>
+            </a:effectRef>
+            <a:fontRef idx="minor">
+              <a:schemeClr val="lt1"/>
+            </a:fontRef>
+          </p:style>
+          <p:txBody>
+            <a:bodyPr rtlCol="0" anchor="ctr"/>
+            <a:lstStyle/>
+            <a:p>
+              <a:pPr algn="ctr"/>
+              <a:endParaRPr lang="en-US"/>
+            </a:p>
+          </p:txBody>
+        </p:sp>
+      </p:grpSp>
     </p:spTree>
     <p:extLst>
       <p:ext uri="{BB962C8B-B14F-4D97-AF65-F5344CB8AC3E}">

</xml_diff>

<commit_message>
Project Comments, third commit. Progress: scenes.settings. Uploaded new card foreground.
</commit_message>
<xml_diff>
--- a/Card_Workspace.pptx
+++ b/Card_Workspace.pptx
@@ -242,7 +242,7 @@
           <a:p>
             <a:fld id="{6CF9682D-768F-4AA3-9D0E-91D451BE2888}" type="datetimeFigureOut">
               <a:rPr lang="en-US" smtClean="0"/>
-              <a:t>7/12/2019</a:t>
+              <a:t>11/24/2019</a:t>
             </a:fld>
             <a:endParaRPr lang="en-US"/>
           </a:p>
@@ -410,7 +410,7 @@
           <a:p>
             <a:fld id="{6CF9682D-768F-4AA3-9D0E-91D451BE2888}" type="datetimeFigureOut">
               <a:rPr lang="en-US" smtClean="0"/>
-              <a:t>7/12/2019</a:t>
+              <a:t>11/24/2019</a:t>
             </a:fld>
             <a:endParaRPr lang="en-US"/>
           </a:p>
@@ -588,7 +588,7 @@
           <a:p>
             <a:fld id="{6CF9682D-768F-4AA3-9D0E-91D451BE2888}" type="datetimeFigureOut">
               <a:rPr lang="en-US" smtClean="0"/>
-              <a:t>7/12/2019</a:t>
+              <a:t>11/24/2019</a:t>
             </a:fld>
             <a:endParaRPr lang="en-US"/>
           </a:p>
@@ -756,7 +756,7 @@
           <a:p>
             <a:fld id="{6CF9682D-768F-4AA3-9D0E-91D451BE2888}" type="datetimeFigureOut">
               <a:rPr lang="en-US" smtClean="0"/>
-              <a:t>7/12/2019</a:t>
+              <a:t>11/24/2019</a:t>
             </a:fld>
             <a:endParaRPr lang="en-US"/>
           </a:p>
@@ -1001,7 +1001,7 @@
           <a:p>
             <a:fld id="{6CF9682D-768F-4AA3-9D0E-91D451BE2888}" type="datetimeFigureOut">
               <a:rPr lang="en-US" smtClean="0"/>
-              <a:t>7/12/2019</a:t>
+              <a:t>11/24/2019</a:t>
             </a:fld>
             <a:endParaRPr lang="en-US"/>
           </a:p>
@@ -1230,7 +1230,7 @@
           <a:p>
             <a:fld id="{6CF9682D-768F-4AA3-9D0E-91D451BE2888}" type="datetimeFigureOut">
               <a:rPr lang="en-US" smtClean="0"/>
-              <a:t>7/12/2019</a:t>
+              <a:t>11/24/2019</a:t>
             </a:fld>
             <a:endParaRPr lang="en-US"/>
           </a:p>
@@ -1594,7 +1594,7 @@
           <a:p>
             <a:fld id="{6CF9682D-768F-4AA3-9D0E-91D451BE2888}" type="datetimeFigureOut">
               <a:rPr lang="en-US" smtClean="0"/>
-              <a:t>7/12/2019</a:t>
+              <a:t>11/24/2019</a:t>
             </a:fld>
             <a:endParaRPr lang="en-US"/>
           </a:p>
@@ -1711,7 +1711,7 @@
           <a:p>
             <a:fld id="{6CF9682D-768F-4AA3-9D0E-91D451BE2888}" type="datetimeFigureOut">
               <a:rPr lang="en-US" smtClean="0"/>
-              <a:t>7/12/2019</a:t>
+              <a:t>11/24/2019</a:t>
             </a:fld>
             <a:endParaRPr lang="en-US"/>
           </a:p>
@@ -1806,7 +1806,7 @@
           <a:p>
             <a:fld id="{6CF9682D-768F-4AA3-9D0E-91D451BE2888}" type="datetimeFigureOut">
               <a:rPr lang="en-US" smtClean="0"/>
-              <a:t>7/12/2019</a:t>
+              <a:t>11/24/2019</a:t>
             </a:fld>
             <a:endParaRPr lang="en-US"/>
           </a:p>
@@ -2081,7 +2081,7 @@
           <a:p>
             <a:fld id="{6CF9682D-768F-4AA3-9D0E-91D451BE2888}" type="datetimeFigureOut">
               <a:rPr lang="en-US" smtClean="0"/>
-              <a:t>7/12/2019</a:t>
+              <a:t>11/24/2019</a:t>
             </a:fld>
             <a:endParaRPr lang="en-US"/>
           </a:p>
@@ -2333,7 +2333,7 @@
           <a:p>
             <a:fld id="{6CF9682D-768F-4AA3-9D0E-91D451BE2888}" type="datetimeFigureOut">
               <a:rPr lang="en-US" smtClean="0"/>
-              <a:t>7/12/2019</a:t>
+              <a:t>11/24/2019</a:t>
             </a:fld>
             <a:endParaRPr lang="en-US"/>
           </a:p>
@@ -2544,7 +2544,7 @@
           <a:p>
             <a:fld id="{6CF9682D-768F-4AA3-9D0E-91D451BE2888}" type="datetimeFigureOut">
               <a:rPr lang="en-US" smtClean="0"/>
-              <a:t>7/12/2019</a:t>
+              <a:t>11/24/2019</a:t>
             </a:fld>
             <a:endParaRPr lang="en-US"/>
           </a:p>
@@ -4470,6 +4470,52 @@
           </p:txBody>
         </p:sp>
       </p:grpSp>
+      <p:pic>
+        <p:nvPicPr>
+          <p:cNvPr id="20" name="图片 19">
+            <a:extLst>
+              <a:ext uri="{FF2B5EF4-FFF2-40B4-BE49-F238E27FC236}">
+                <a16:creationId xmlns:a16="http://schemas.microsoft.com/office/drawing/2014/main" id="{C0E2FD71-1CB0-4742-92A4-78C27867710C}"/>
+              </a:ext>
+            </a:extLst>
+          </p:cNvPr>
+          <p:cNvPicPr>
+            <a:picLocks noChangeAspect="1"/>
+          </p:cNvPicPr>
+          <p:nvPr/>
+        </p:nvPicPr>
+        <p:blipFill>
+          <a:blip r:embed="rId3" cstate="print">
+            <a:clrChange>
+              <a:clrFrom>
+                <a:srgbClr val="FFFFFF"/>
+              </a:clrFrom>
+              <a:clrTo>
+                <a:srgbClr val="FFFFFF">
+                  <a:alpha val="0"/>
+                </a:srgbClr>
+              </a:clrTo>
+            </a:clrChange>
+            <a:extLst>
+              <a:ext uri="{28A0092B-C50C-407E-A947-70E740481C1C}">
+                <a14:useLocalDpi xmlns:a14="http://schemas.microsoft.com/office/drawing/2010/main" val="0"/>
+              </a:ext>
+            </a:extLst>
+          </a:blip>
+          <a:stretch>
+            <a:fillRect/>
+          </a:stretch>
+        </p:blipFill>
+        <p:spPr>
+          <a:xfrm>
+            <a:off x="7384568" y="0"/>
+            <a:ext cx="4848873" cy="6858000"/>
+          </a:xfrm>
+          <a:prstGeom prst="rect">
+            <a:avLst/>
+          </a:prstGeom>
+        </p:spPr>
+      </p:pic>
     </p:spTree>
     <p:extLst>
       <p:ext uri="{BB962C8B-B14F-4D97-AF65-F5344CB8AC3E}">

</xml_diff>